<commit_message>
Added feature comparison XLS. WIP on presentation
</commit_message>
<xml_diff>
--- a/.NET Serialization.pptx
+++ b/.NET Serialization.pptx
@@ -10,7 +10,10 @@
     <p:sldId id="257" r:id="rId4"/>
     <p:sldId id="273" r:id="rId5"/>
     <p:sldId id="274" r:id="rId6"/>
-    <p:sldId id="275" r:id="rId7"/>
+    <p:sldId id="278" r:id="rId7"/>
+    <p:sldId id="275" r:id="rId8"/>
+    <p:sldId id="276" r:id="rId9"/>
+    <p:sldId id="277" r:id="rId10"/>
   </p:sldIdLst>
   <p:sldSz cx="9144000" cy="6858000" type="screen4x3"/>
   <p:notesSz cx="6858000" cy="9144000"/>
@@ -25943,7 +25946,7 @@
           <p:nvPr>
             <p:extLst>
               <p:ext uri="{D42A27DB-BD31-4B8C-83A1-F6EECF244321}">
-                <p14:modId xmlns:p14="http://schemas.microsoft.com/office/powerpoint/2010/main" val="1326741065"/>
+                <p14:modId xmlns:p14="http://schemas.microsoft.com/office/powerpoint/2010/main" val="334799723"/>
               </p:ext>
             </p:extLst>
           </p:nvPr>
@@ -26500,21 +26503,36 @@
                     <a:bodyPr/>
                     <a:lstStyle/>
                     <a:p>
-                      <a:pPr marL="0" marR="0" fontAlgn="t">
+                      <a:pPr marL="0" marR="0" indent="0" algn="l" defTabSz="914400" rtl="0" eaLnBrk="1" fontAlgn="t" latinLnBrk="0" hangingPunct="1">
+                        <a:lnSpc>
+                          <a:spcPct val="100000"/>
+                        </a:lnSpc>
                         <a:spcBef>
                           <a:spcPts val="0"/>
                         </a:spcBef>
                         <a:spcAft>
                           <a:spcPts val="0"/>
                         </a:spcAft>
+                        <a:buClrTx/>
+                        <a:buSzTx/>
+                        <a:buFontTx/>
+                        <a:buNone/>
+                        <a:tabLst/>
+                        <a:defRPr/>
                       </a:pPr>
                       <a:r>
-                        <a:rPr lang="en-US" sz="2000">
+                        <a:rPr lang="en-US" sz="2000" dirty="0" smtClean="0">
                           <a:effectLst/>
                         </a:rPr>
-                        <a:t>OS</a:t>
+                        <a:t>Open </a:t>
                       </a:r>
-                      <a:endParaRPr lang="en-US" sz="2000">
+                      <a:r>
+                        <a:rPr lang="en-US" sz="2000" dirty="0" err="1" smtClean="0">
+                          <a:effectLst/>
+                        </a:rPr>
+                        <a:t>Src</a:t>
+                      </a:r>
+                      <a:endParaRPr lang="en-US" sz="2000" dirty="0" smtClean="0">
                         <a:effectLst/>
                         <a:latin typeface="Calibri" panose="020F0502020204030204" pitchFamily="34" charset="0"/>
                       </a:endParaRPr>
@@ -26592,12 +26610,18 @@
                         </a:spcAft>
                       </a:pPr>
                       <a:r>
-                        <a:rPr lang="en-US" sz="2000">
+                        <a:rPr lang="en-US" sz="2000" dirty="0" smtClean="0">
                           <a:effectLst/>
                         </a:rPr>
-                        <a:t>OS</a:t>
+                        <a:t>Open </a:t>
                       </a:r>
-                      <a:endParaRPr lang="en-US" sz="2000">
+                      <a:r>
+                        <a:rPr lang="en-US" sz="2000" dirty="0" err="1" smtClean="0">
+                          <a:effectLst/>
+                        </a:rPr>
+                        <a:t>Src</a:t>
+                      </a:r>
+                      <a:endParaRPr lang="en-US" sz="2000" dirty="0">
                         <a:effectLst/>
                         <a:latin typeface="Calibri" panose="020F0502020204030204" pitchFamily="34" charset="0"/>
                       </a:endParaRPr>
@@ -26683,10 +26707,16 @@
                         </a:spcAft>
                       </a:pPr>
                       <a:r>
-                        <a:rPr lang="en-US" sz="2000" dirty="0">
+                        <a:rPr lang="en-US" sz="2000" dirty="0" smtClean="0">
                           <a:effectLst/>
                         </a:rPr>
-                        <a:t>Google</a:t>
+                        <a:t>Open </a:t>
+                      </a:r>
+                      <a:r>
+                        <a:rPr lang="en-US" sz="2000" dirty="0" err="1" smtClean="0">
+                          <a:effectLst/>
+                        </a:rPr>
+                        <a:t>Src</a:t>
                       </a:r>
                       <a:endParaRPr lang="en-US" sz="2000" dirty="0">
                         <a:effectLst/>
@@ -26859,6 +26889,120 @@
           <a:p>
             <a:r>
               <a:rPr lang="en-US" dirty="0" smtClean="0"/>
+              <a:t>What Do They Serialize</a:t>
+            </a:r>
+            <a:endParaRPr lang="en-US" dirty="0"/>
+          </a:p>
+        </p:txBody>
+      </p:sp>
+      <p:sp>
+        <p:nvSpPr>
+          <p:cNvPr id="3" name="Content Placeholder 2"/>
+          <p:cNvSpPr>
+            <a:spLocks noGrp="1"/>
+          </p:cNvSpPr>
+          <p:nvPr>
+            <p:ph idx="1"/>
+          </p:nvPr>
+        </p:nvSpPr>
+        <p:spPr/>
+        <p:txBody>
+          <a:bodyPr/>
+          <a:lstStyle/>
+          <a:p>
+            <a:r>
+              <a:rPr lang="en-US" dirty="0" err="1" smtClean="0"/>
+              <a:t>XmlSerializer</a:t>
+            </a:r>
+            <a:endParaRPr lang="en-US" dirty="0" smtClean="0"/>
+          </a:p>
+          <a:p>
+            <a:pPr lvl="1"/>
+            <a:r>
+              <a:rPr lang="en-US" dirty="0" smtClean="0"/>
+              <a:t>Public </a:t>
+            </a:r>
+            <a:r>
+              <a:rPr lang="en-US" dirty="0"/>
+              <a:t>fields and property </a:t>
+            </a:r>
+            <a:r>
+              <a:rPr lang="en-US" dirty="0" smtClean="0"/>
+              <a:t>values</a:t>
+            </a:r>
+          </a:p>
+          <a:p>
+            <a:r>
+              <a:rPr lang="en-US" dirty="0" err="1" smtClean="0"/>
+              <a:t>BinaryFormatter</a:t>
+            </a:r>
+            <a:r>
+              <a:rPr lang="en-US" dirty="0" smtClean="0"/>
+              <a:t>, </a:t>
+            </a:r>
+            <a:r>
+              <a:rPr lang="en-US" dirty="0" err="1" smtClean="0"/>
+              <a:t>CompactFormatter</a:t>
+            </a:r>
+            <a:endParaRPr lang="en-US" dirty="0" smtClean="0"/>
+          </a:p>
+          <a:p>
+            <a:pPr lvl="1"/>
+            <a:r>
+              <a:rPr lang="en-US" dirty="0" smtClean="0"/>
+              <a:t>Fields</a:t>
+            </a:r>
+            <a:endParaRPr lang="en-US" dirty="0"/>
+          </a:p>
+        </p:txBody>
+      </p:sp>
+    </p:spTree>
+    <p:extLst>
+      <p:ext uri="{BB962C8B-B14F-4D97-AF65-F5344CB8AC3E}">
+        <p14:creationId xmlns:p14="http://schemas.microsoft.com/office/powerpoint/2010/main" val="2251370834"/>
+      </p:ext>
+    </p:extLst>
+  </p:cSld>
+  <p:clrMapOvr>
+    <a:masterClrMapping/>
+  </p:clrMapOvr>
+</p:sld>
+</file>
+
+<file path=ppt/slides/slide7.xml><?xml version="1.0" encoding="utf-8"?>
+<p:sld xmlns:a="http://schemas.openxmlformats.org/drawingml/2006/main" xmlns:r="http://schemas.openxmlformats.org/officeDocument/2006/relationships" xmlns:p="http://schemas.openxmlformats.org/presentationml/2006/main">
+  <p:cSld>
+    <p:spTree>
+      <p:nvGrpSpPr>
+        <p:cNvPr id="1" name=""/>
+        <p:cNvGrpSpPr/>
+        <p:nvPr/>
+      </p:nvGrpSpPr>
+      <p:grpSpPr>
+        <a:xfrm>
+          <a:off x="0" y="0"/>
+          <a:ext cx="0" cy="0"/>
+          <a:chOff x="0" y="0"/>
+          <a:chExt cx="0" cy="0"/>
+        </a:xfrm>
+      </p:grpSpPr>
+      <p:sp>
+        <p:nvSpPr>
+          <p:cNvPr id="2" name="Title 1"/>
+          <p:cNvSpPr>
+            <a:spLocks noGrp="1"/>
+          </p:cNvSpPr>
+          <p:nvPr>
+            <p:ph type="title"/>
+          </p:nvPr>
+        </p:nvSpPr>
+        <p:spPr/>
+        <p:txBody>
+          <a:bodyPr/>
+          <a:lstStyle/>
+          <a:p>
+            <a:r>
+              <a:rPr lang="en-US" dirty="0" smtClean="0"/>
               <a:t>Basic Examples</a:t>
             </a:r>
             <a:endParaRPr lang="en-US" dirty="0"/>
@@ -26888,6 +27032,216 @@
     <p:extLst>
       <p:ext uri="{BB962C8B-B14F-4D97-AF65-F5344CB8AC3E}">
         <p14:creationId xmlns:p14="http://schemas.microsoft.com/office/powerpoint/2010/main" val="37772462"/>
+      </p:ext>
+    </p:extLst>
+  </p:cSld>
+  <p:clrMapOvr>
+    <a:masterClrMapping/>
+  </p:clrMapOvr>
+</p:sld>
+</file>
+
+<file path=ppt/slides/slide8.xml><?xml version="1.0" encoding="utf-8"?>
+<p:sld xmlns:a="http://schemas.openxmlformats.org/drawingml/2006/main" xmlns:r="http://schemas.openxmlformats.org/officeDocument/2006/relationships" xmlns:p="http://schemas.openxmlformats.org/presentationml/2006/main">
+  <p:cSld>
+    <p:spTree>
+      <p:nvGrpSpPr>
+        <p:cNvPr id="1" name=""/>
+        <p:cNvGrpSpPr/>
+        <p:nvPr/>
+      </p:nvGrpSpPr>
+      <p:grpSpPr>
+        <a:xfrm>
+          <a:off x="0" y="0"/>
+          <a:ext cx="0" cy="0"/>
+          <a:chOff x="0" y="0"/>
+          <a:chExt cx="0" cy="0"/>
+        </a:xfrm>
+      </p:grpSpPr>
+      <p:sp>
+        <p:nvSpPr>
+          <p:cNvPr id="2" name="Title 1"/>
+          <p:cNvSpPr>
+            <a:spLocks noGrp="1"/>
+          </p:cNvSpPr>
+          <p:nvPr>
+            <p:ph type="title"/>
+          </p:nvPr>
+        </p:nvSpPr>
+        <p:spPr/>
+        <p:txBody>
+          <a:bodyPr/>
+          <a:lstStyle/>
+          <a:p>
+            <a:r>
+              <a:rPr lang="en-US" dirty="0" smtClean="0"/>
+              <a:t>How It Works</a:t>
+            </a:r>
+            <a:endParaRPr lang="en-US" dirty="0"/>
+          </a:p>
+        </p:txBody>
+      </p:sp>
+      <p:sp>
+        <p:nvSpPr>
+          <p:cNvPr id="3" name="Content Placeholder 2"/>
+          <p:cNvSpPr>
+            <a:spLocks noGrp="1"/>
+          </p:cNvSpPr>
+          <p:nvPr>
+            <p:ph idx="1"/>
+          </p:nvPr>
+        </p:nvSpPr>
+        <p:spPr/>
+        <p:txBody>
+          <a:bodyPr/>
+          <a:lstStyle/>
+          <a:p>
+            <a:r>
+              <a:rPr lang="en-US" dirty="0" smtClean="0"/>
+              <a:t>Reflection to read properties or fields</a:t>
+            </a:r>
+          </a:p>
+          <a:p>
+            <a:r>
+              <a:rPr lang="en-US" dirty="0" smtClean="0"/>
+              <a:t>Transformation of known types to byte or character streams</a:t>
+            </a:r>
+          </a:p>
+          <a:p>
+            <a:r>
+              <a:rPr lang="en-US" dirty="0" smtClean="0"/>
+              <a:t>Varying by implementation</a:t>
+            </a:r>
+          </a:p>
+          <a:p>
+            <a:pPr lvl="1"/>
+            <a:r>
+              <a:rPr lang="en-US" dirty="0" smtClean="0"/>
+              <a:t>Recording of field name</a:t>
+            </a:r>
+          </a:p>
+          <a:p>
+            <a:pPr lvl="1"/>
+            <a:r>
+              <a:rPr lang="en-US" dirty="0" smtClean="0"/>
+              <a:t>Recording of data type</a:t>
+            </a:r>
+          </a:p>
+          <a:p>
+            <a:pPr lvl="1"/>
+            <a:r>
+              <a:rPr lang="en-US" dirty="0" smtClean="0"/>
+              <a:t>Recording of data value</a:t>
+            </a:r>
+            <a:endParaRPr lang="en-US" dirty="0"/>
+          </a:p>
+        </p:txBody>
+      </p:sp>
+    </p:spTree>
+    <p:extLst>
+      <p:ext uri="{BB962C8B-B14F-4D97-AF65-F5344CB8AC3E}">
+        <p14:creationId xmlns:p14="http://schemas.microsoft.com/office/powerpoint/2010/main" val="1697173030"/>
+      </p:ext>
+    </p:extLst>
+  </p:cSld>
+  <p:clrMapOvr>
+    <a:masterClrMapping/>
+  </p:clrMapOvr>
+</p:sld>
+</file>
+
+<file path=ppt/slides/slide9.xml><?xml version="1.0" encoding="utf-8"?>
+<p:sld xmlns:a="http://schemas.openxmlformats.org/drawingml/2006/main" xmlns:r="http://schemas.openxmlformats.org/officeDocument/2006/relationships" xmlns:p="http://schemas.openxmlformats.org/presentationml/2006/main">
+  <p:cSld>
+    <p:spTree>
+      <p:nvGrpSpPr>
+        <p:cNvPr id="1" name=""/>
+        <p:cNvGrpSpPr/>
+        <p:nvPr/>
+      </p:nvGrpSpPr>
+      <p:grpSpPr>
+        <a:xfrm>
+          <a:off x="0" y="0"/>
+          <a:ext cx="0" cy="0"/>
+          <a:chOff x="0" y="0"/>
+          <a:chExt cx="0" cy="0"/>
+        </a:xfrm>
+      </p:grpSpPr>
+      <p:sp>
+        <p:nvSpPr>
+          <p:cNvPr id="2" name="Title 1"/>
+          <p:cNvSpPr>
+            <a:spLocks noGrp="1"/>
+          </p:cNvSpPr>
+          <p:nvPr>
+            <p:ph type="title"/>
+          </p:nvPr>
+        </p:nvSpPr>
+        <p:spPr/>
+        <p:txBody>
+          <a:bodyPr/>
+          <a:lstStyle/>
+          <a:p>
+            <a:r>
+              <a:rPr lang="en-US" dirty="0" smtClean="0"/>
+              <a:t>Attributes</a:t>
+            </a:r>
+            <a:endParaRPr lang="en-US" dirty="0"/>
+          </a:p>
+        </p:txBody>
+      </p:sp>
+      <p:sp>
+        <p:nvSpPr>
+          <p:cNvPr id="3" name="Content Placeholder 2"/>
+          <p:cNvSpPr>
+            <a:spLocks noGrp="1"/>
+          </p:cNvSpPr>
+          <p:nvPr>
+            <p:ph idx="1"/>
+          </p:nvPr>
+        </p:nvSpPr>
+        <p:spPr/>
+        <p:txBody>
+          <a:bodyPr/>
+          <a:lstStyle/>
+          <a:p>
+            <a:r>
+              <a:rPr lang="en-US" dirty="0" err="1" smtClean="0"/>
+              <a:t>Serializable</a:t>
+            </a:r>
+            <a:endParaRPr lang="en-US" dirty="0" smtClean="0"/>
+          </a:p>
+          <a:p>
+            <a:pPr lvl="1"/>
+            <a:r>
+              <a:rPr lang="en-US" dirty="0" smtClean="0"/>
+              <a:t>Apply to Types</a:t>
+            </a:r>
+          </a:p>
+          <a:p>
+            <a:r>
+              <a:rPr lang="en-US" dirty="0" err="1" smtClean="0"/>
+              <a:t>NonSerialized</a:t>
+            </a:r>
+            <a:endParaRPr lang="en-US" dirty="0" smtClean="0"/>
+          </a:p>
+          <a:p>
+            <a:pPr lvl="1"/>
+            <a:r>
+              <a:rPr lang="en-US" dirty="0" smtClean="0"/>
+              <a:t>Apply to Types, Properties</a:t>
+            </a:r>
+            <a:r>
+              <a:rPr lang="en-US" dirty="0"/>
+              <a:t>, Fields</a:t>
+            </a:r>
+          </a:p>
+        </p:txBody>
+      </p:sp>
+    </p:spTree>
+    <p:extLst>
+      <p:ext uri="{BB962C8B-B14F-4D97-AF65-F5344CB8AC3E}">
+        <p14:creationId xmlns:p14="http://schemas.microsoft.com/office/powerpoint/2010/main" val="961612886"/>
       </p:ext>
     </p:extLst>
   </p:cSld>

</xml_diff>

<commit_message>
Basic examples return serialized data
</commit_message>
<xml_diff>
--- a/.NET Serialization.pptx
+++ b/.NET Serialization.pptx
@@ -25946,14 +25946,14 @@
           <p:nvPr>
             <p:extLst>
               <p:ext uri="{D42A27DB-BD31-4B8C-83A1-F6EECF244321}">
-                <p14:modId xmlns:p14="http://schemas.microsoft.com/office/powerpoint/2010/main" val="3624973861"/>
+                <p14:modId xmlns:p14="http://schemas.microsoft.com/office/powerpoint/2010/main" val="1449345151"/>
               </p:ext>
             </p:extLst>
           </p:nvPr>
         </p:nvGraphicFramePr>
         <p:xfrm>
           <a:off x="609600" y="1418556"/>
-          <a:ext cx="7772400" cy="5112490"/>
+          <a:ext cx="7772400" cy="5303518"/>
         </p:xfrm>
         <a:graphic>
           <a:graphicData uri="http://schemas.openxmlformats.org/drawingml/2006/table">
@@ -25966,7 +25966,7 @@
                 <a:gridCol w="1524000"/>
                 <a:gridCol w="2819400"/>
               </a:tblGrid>
-              <a:tr h="511249">
+              <a:tr h="482138">
                 <a:tc>
                   <a:txBody>
                     <a:bodyPr/>
@@ -26049,7 +26049,7 @@
                   <a:tcPr marL="50800" marR="50800" marT="50800" marB="50800"/>
                 </a:tc>
               </a:tr>
-              <a:tr h="511249">
+              <a:tr h="482138">
                 <a:tc>
                   <a:txBody>
                     <a:bodyPr/>
@@ -26064,15 +26064,26 @@
                         </a:spcAft>
                       </a:pPr>
                       <a:r>
-                        <a:rPr lang="en-US" sz="2000" dirty="0" err="1">
+                        <a:rPr lang="en-US" sz="2000" kern="1200" dirty="0" err="1">
+                          <a:solidFill>
+                            <a:schemeClr val="dk1"/>
+                          </a:solidFill>
                           <a:effectLst/>
+                          <a:latin typeface="+mn-lt"/>
+                          <a:ea typeface="+mn-ea"/>
+                          <a:cs typeface="+mn-cs"/>
                           <a:hlinkClick r:id="rId2"/>
                         </a:rPr>
                         <a:t>BinaryFormatter</a:t>
                       </a:r>
-                      <a:endParaRPr lang="en-US" sz="2000" dirty="0">
+                      <a:endParaRPr lang="en-US" sz="2000" kern="1200" dirty="0">
+                        <a:solidFill>
+                          <a:schemeClr val="dk1"/>
+                        </a:solidFill>
                         <a:effectLst/>
-                        <a:latin typeface="Calibri" panose="020F0502020204030204" pitchFamily="34" charset="0"/>
+                        <a:latin typeface="+mn-lt"/>
+                        <a:ea typeface="+mn-ea"/>
+                        <a:cs typeface="+mn-cs"/>
                       </a:endParaRPr>
                     </a:p>
                   </a:txBody>
@@ -26119,12 +26130,12 @@
                         </a:spcAft>
                       </a:pPr>
                       <a:r>
-                        <a:rPr lang="en-US" sz="2000">
+                        <a:rPr lang="en-US" sz="2000" dirty="0">
                           <a:effectLst/>
                         </a:rPr>
                         <a:t>Binary</a:t>
                       </a:r>
-                      <a:endParaRPr lang="en-US" sz="2000">
+                      <a:endParaRPr lang="en-US" sz="2000" dirty="0">
                         <a:effectLst/>
                         <a:latin typeface="Calibri" panose="020F0502020204030204" pitchFamily="34" charset="0"/>
                       </a:endParaRPr>
@@ -26133,7 +26144,7 @@
                   <a:tcPr marL="50800" marR="50800" marT="50800" marB="50800"/>
                 </a:tc>
               </a:tr>
-              <a:tr h="511249">
+              <a:tr h="482138">
                 <a:tc>
                   <a:txBody>
                     <a:bodyPr/>
@@ -26217,7 +26228,7 @@
                   <a:tcPr marL="50800" marR="50800" marT="50800" marB="50800"/>
                 </a:tc>
               </a:tr>
-              <a:tr h="511249">
+              <a:tr h="482138">
                 <a:tc>
                   <a:txBody>
                     <a:bodyPr/>
@@ -26301,7 +26312,7 @@
                   <a:tcPr marL="50800" marR="50800" marT="50800" marB="50800"/>
                 </a:tc>
               </a:tr>
-              <a:tr h="511249">
+              <a:tr h="482138">
                 <a:tc>
                   <a:txBody>
                     <a:bodyPr/>
@@ -26385,7 +26396,7 @@
                   <a:tcPr marL="50800" marR="50800" marT="50800" marB="50800"/>
                 </a:tc>
               </a:tr>
-              <a:tr h="511249">
+              <a:tr h="482138">
                 <a:tc>
                   <a:txBody>
                     <a:bodyPr/>
@@ -26469,7 +26480,7 @@
                   <a:tcPr marL="50800" marR="50800" marT="50800" marB="50800"/>
                 </a:tc>
               </a:tr>
-              <a:tr h="511249">
+              <a:tr h="482138">
                 <a:tc>
                   <a:txBody>
                     <a:bodyPr/>
@@ -26568,7 +26579,7 @@
                   <a:tcPr marL="50800" marR="50800" marT="50800" marB="50800"/>
                 </a:tc>
               </a:tr>
-              <a:tr h="511249">
+              <a:tr h="482138">
                 <a:tc>
                   <a:txBody>
                     <a:bodyPr/>
@@ -26657,7 +26668,7 @@
                   <a:tcPr marL="50800" marR="50800" marT="50800" marB="50800"/>
                 </a:tc>
               </a:tr>
-              <a:tr h="511249">
+              <a:tr h="482138">
                 <a:tc>
                   <a:txBody>
                     <a:bodyPr/>
@@ -26754,7 +26765,7 @@
                   <a:tcPr marL="50800" marR="50800" marT="50800" marB="50800"/>
                 </a:tc>
               </a:tr>
-              <a:tr h="511249">
+              <a:tr h="482138">
                 <a:tc>
                   <a:txBody>
                     <a:bodyPr/>
@@ -26838,6 +26849,99 @@
                   <a:tcPr marL="50800" marR="50800" marT="50800" marB="50800"/>
                 </a:tc>
               </a:tr>
+              <a:tr h="482138">
+                <a:tc>
+                  <a:txBody>
+                    <a:bodyPr/>
+                    <a:lstStyle/>
+                    <a:p>
+                      <a:pPr marL="0" marR="0" fontAlgn="t">
+                        <a:spcBef>
+                          <a:spcPts val="0"/>
+                        </a:spcBef>
+                        <a:spcAft>
+                          <a:spcPts val="0"/>
+                        </a:spcAft>
+                      </a:pPr>
+                      <a:r>
+                        <a:rPr lang="en-US" sz="2000" dirty="0" smtClean="0">
+                          <a:effectLst/>
+                          <a:latin typeface="Calibri" panose="020F0502020204030204" pitchFamily="34" charset="0"/>
+                        </a:rPr>
+                        <a:t>Many other open source tools</a:t>
+                      </a:r>
+                      <a:endParaRPr lang="en-US" sz="2000" dirty="0">
+                        <a:effectLst/>
+                        <a:latin typeface="Calibri" panose="020F0502020204030204" pitchFamily="34" charset="0"/>
+                      </a:endParaRPr>
+                    </a:p>
+                  </a:txBody>
+                  <a:tcPr marL="50800" marR="50800" marT="50800" marB="50800"/>
+                </a:tc>
+                <a:tc>
+                  <a:txBody>
+                    <a:bodyPr/>
+                    <a:lstStyle/>
+                    <a:p>
+                      <a:pPr marL="0" marR="0" fontAlgn="t">
+                        <a:spcBef>
+                          <a:spcPts val="0"/>
+                        </a:spcBef>
+                        <a:spcAft>
+                          <a:spcPts val="0"/>
+                        </a:spcAft>
+                      </a:pPr>
+                      <a:r>
+                        <a:rPr lang="en-US" sz="2000" dirty="0" smtClean="0">
+                          <a:effectLst/>
+                          <a:latin typeface="Calibri" panose="020F0502020204030204" pitchFamily="34" charset="0"/>
+                        </a:rPr>
+                        <a:t>Open </a:t>
+                      </a:r>
+                      <a:r>
+                        <a:rPr lang="en-US" sz="2000" dirty="0" err="1" smtClean="0">
+                          <a:effectLst/>
+                          <a:latin typeface="Calibri" panose="020F0502020204030204" pitchFamily="34" charset="0"/>
+                        </a:rPr>
+                        <a:t>Src</a:t>
+                      </a:r>
+                      <a:endParaRPr lang="en-US" sz="2000" dirty="0">
+                        <a:effectLst/>
+                        <a:latin typeface="Calibri" panose="020F0502020204030204" pitchFamily="34" charset="0"/>
+                      </a:endParaRPr>
+                    </a:p>
+                  </a:txBody>
+                  <a:tcPr marL="50800" marR="50800" marT="50800" marB="50800"/>
+                </a:tc>
+                <a:tc>
+                  <a:txBody>
+                    <a:bodyPr/>
+                    <a:lstStyle/>
+                    <a:p>
+                      <a:pPr marL="0" marR="0" fontAlgn="t">
+                        <a:spcBef>
+                          <a:spcPts val="0"/>
+                        </a:spcBef>
+                        <a:spcAft>
+                          <a:spcPts val="0"/>
+                        </a:spcAft>
+                      </a:pPr>
+                      <a:r>
+                        <a:rPr lang="en-US" sz="2000" dirty="0" smtClean="0">
+                          <a:effectLst/>
+                          <a:latin typeface="Calibri" panose="020F0502020204030204" pitchFamily="34" charset="0"/>
+                        </a:rPr>
+                        <a:t>Various</a:t>
+                      </a:r>
+                      <a:endParaRPr lang="en-US" sz="2000" dirty="0">
+                        <a:effectLst/>
+                        <a:latin typeface="Calibri" panose="020F0502020204030204" pitchFamily="34" charset="0"/>
+                      </a:endParaRPr>
+                    </a:p>
+                  </a:txBody>
+                  <a:tcPr marL="50800" marR="50800" marT="50800" marB="50800"/>
+                </a:tc>
+              </a:tr>
             </a:tbl>
           </a:graphicData>
         </a:graphic>
@@ -26905,16 +27009,58 @@
             <p:ph idx="1"/>
           </p:nvPr>
         </p:nvSpPr>
-        <p:spPr/>
+        <p:spPr>
+          <a:xfrm>
+            <a:off x="457200" y="1600200"/>
+            <a:ext cx="8458200" cy="4533900"/>
+          </a:xfrm>
+        </p:spPr>
         <p:txBody>
           <a:bodyPr/>
           <a:lstStyle/>
           <a:p>
             <a:r>
+              <a:rPr lang="en-US" dirty="0" smtClean="0"/>
+              <a:t>Generally</a:t>
+            </a:r>
+          </a:p>
+          <a:p>
+            <a:pPr lvl="1"/>
+            <a:r>
+              <a:rPr lang="en-US" dirty="0" smtClean="0"/>
+              <a:t>Type information</a:t>
+            </a:r>
+          </a:p>
+          <a:p>
+            <a:pPr lvl="1"/>
+            <a:r>
+              <a:rPr lang="en-US" dirty="0" smtClean="0"/>
+              <a:t>Member type information</a:t>
+            </a:r>
+          </a:p>
+          <a:p>
+            <a:pPr lvl="1"/>
+            <a:r>
+              <a:rPr lang="en-US" dirty="0" smtClean="0"/>
+              <a:t>Member name information or use sequence</a:t>
+            </a:r>
+          </a:p>
+          <a:p>
+            <a:pPr lvl="1"/>
+            <a:r>
+              <a:rPr lang="en-US" dirty="0" smtClean="0"/>
+              <a:t>Member values</a:t>
+            </a:r>
+          </a:p>
+          <a:p>
+            <a:r>
               <a:rPr lang="en-US" dirty="0" err="1" smtClean="0"/>
               <a:t>XmlSerializer</a:t>
             </a:r>
-            <a:endParaRPr lang="en-US" dirty="0" smtClean="0"/>
+            <a:r>
+              <a:rPr lang="en-US" dirty="0" smtClean="0"/>
+              <a:t>, JSON.NET, DCJS</a:t>
+            </a:r>
           </a:p>
           <a:p>
             <a:pPr lvl="1"/>
@@ -26944,7 +27090,10 @@
               <a:rPr lang="en-US" dirty="0" err="1" smtClean="0"/>
               <a:t>CompactFormatter</a:t>
             </a:r>
-            <a:endParaRPr lang="en-US" dirty="0" smtClean="0"/>
+            <a:r>
+              <a:rPr lang="en-US" dirty="0" smtClean="0"/>
+              <a:t>, DCJS</a:t>
+            </a:r>
           </a:p>
           <a:p>
             <a:pPr lvl="1"/>
@@ -27024,6 +27173,25 @@
           <a:bodyPr/>
           <a:lstStyle/>
           <a:p>
+            <a:pPr marL="0" indent="0" algn="ctr">
+              <a:buNone/>
+            </a:pPr>
+            <a:endParaRPr lang="en-US" dirty="0" smtClean="0"/>
+          </a:p>
+          <a:p>
+            <a:pPr marL="0" indent="0" algn="ctr">
+              <a:buNone/>
+            </a:pPr>
+            <a:endParaRPr lang="en-US" dirty="0"/>
+          </a:p>
+          <a:p>
+            <a:pPr marL="0" indent="0" algn="ctr">
+              <a:buNone/>
+            </a:pPr>
+            <a:r>
+              <a:rPr lang="en-US" dirty="0" smtClean="0"/>
+              <a:t>Let’s see a little code…</a:t>
+            </a:r>
             <a:endParaRPr lang="en-US" dirty="0"/>
           </a:p>
         </p:txBody>
@@ -27110,7 +27278,20 @@
           <a:p>
             <a:r>
               <a:rPr lang="en-US" dirty="0" smtClean="0"/>
-              <a:t>Varying by implementation</a:t>
+              <a:t>Recursion into complex types</a:t>
+            </a:r>
+          </a:p>
+          <a:p>
+            <a:pPr lvl="1"/>
+            <a:r>
+              <a:rPr lang="en-US" dirty="0" smtClean="0"/>
+              <a:t>Detect / prevent loops</a:t>
+            </a:r>
+          </a:p>
+          <a:p>
+            <a:r>
+              <a:rPr lang="en-US" dirty="0" smtClean="0"/>
+              <a:t>Varies by implementation</a:t>
             </a:r>
           </a:p>
           <a:p>
@@ -27128,7 +27309,6 @@
             </a:r>
           </a:p>
           <a:p>
-            <a:pPr lvl="1"/>
             <a:r>
               <a:rPr lang="en-US" dirty="0" smtClean="0"/>
               <a:t>Recording of data value</a:t>
@@ -27219,6 +27399,13 @@
             </a:r>
           </a:p>
           <a:p>
+            <a:pPr lvl="1"/>
+            <a:r>
+              <a:rPr lang="en-US" dirty="0" smtClean="0"/>
+              <a:t>Indicates a type can be serialized</a:t>
+            </a:r>
+          </a:p>
+          <a:p>
             <a:r>
               <a:rPr lang="en-US" dirty="0" err="1" smtClean="0"/>
               <a:t>NonSerialized</a:t>
@@ -27229,12 +27416,24 @@
             <a:pPr lvl="1"/>
             <a:r>
               <a:rPr lang="en-US" dirty="0" smtClean="0"/>
-              <a:t>Apply to Types, Properties</a:t>
+              <a:t>Apply to Properties</a:t>
             </a:r>
             <a:r>
               <a:rPr lang="en-US" dirty="0"/>
-              <a:t>, Fields</a:t>
+              <a:t>, </a:t>
             </a:r>
+            <a:r>
+              <a:rPr lang="en-US" dirty="0" smtClean="0"/>
+              <a:t>Fields</a:t>
+            </a:r>
+          </a:p>
+          <a:p>
+            <a:pPr lvl="1"/>
+            <a:r>
+              <a:rPr lang="en-US" dirty="0" smtClean="0"/>
+              <a:t>Indicates a member should not be serialized</a:t>
+            </a:r>
+            <a:endParaRPr lang="en-US" dirty="0"/>
           </a:p>
         </p:txBody>
       </p:sp>

</xml_diff>

<commit_message>
Simple deserialization examples complete
</commit_message>
<xml_diff>
--- a/.NET Serialization.pptx
+++ b/.NET Serialization.pptx
@@ -9,11 +9,14 @@
     <p:sldId id="272" r:id="rId3"/>
     <p:sldId id="257" r:id="rId4"/>
     <p:sldId id="273" r:id="rId5"/>
-    <p:sldId id="274" r:id="rId6"/>
-    <p:sldId id="278" r:id="rId7"/>
-    <p:sldId id="275" r:id="rId8"/>
-    <p:sldId id="276" r:id="rId9"/>
-    <p:sldId id="277" r:id="rId10"/>
+    <p:sldId id="279" r:id="rId6"/>
+    <p:sldId id="274" r:id="rId7"/>
+    <p:sldId id="278" r:id="rId8"/>
+    <p:sldId id="275" r:id="rId9"/>
+    <p:sldId id="276" r:id="rId10"/>
+    <p:sldId id="277" r:id="rId11"/>
+    <p:sldId id="281" r:id="rId12"/>
+    <p:sldId id="280" r:id="rId13"/>
   </p:sldIdLst>
   <p:sldSz cx="9144000" cy="6858000" type="screen4x3"/>
   <p:notesSz cx="6858000" cy="9144000"/>
@@ -25546,6 +25549,288 @@
 </p:sld>
 </file>
 
+<file path=ppt/slides/slide10.xml><?xml version="1.0" encoding="utf-8"?>
+<p:sld xmlns:a="http://schemas.openxmlformats.org/drawingml/2006/main" xmlns:r="http://schemas.openxmlformats.org/officeDocument/2006/relationships" xmlns:p="http://schemas.openxmlformats.org/presentationml/2006/main">
+  <p:cSld>
+    <p:spTree>
+      <p:nvGrpSpPr>
+        <p:cNvPr id="1" name=""/>
+        <p:cNvGrpSpPr/>
+        <p:nvPr/>
+      </p:nvGrpSpPr>
+      <p:grpSpPr>
+        <a:xfrm>
+          <a:off x="0" y="0"/>
+          <a:ext cx="0" cy="0"/>
+          <a:chOff x="0" y="0"/>
+          <a:chExt cx="0" cy="0"/>
+        </a:xfrm>
+      </p:grpSpPr>
+      <p:sp>
+        <p:nvSpPr>
+          <p:cNvPr id="2" name="Title 1"/>
+          <p:cNvSpPr>
+            <a:spLocks noGrp="1"/>
+          </p:cNvSpPr>
+          <p:nvPr>
+            <p:ph type="title"/>
+          </p:nvPr>
+        </p:nvSpPr>
+        <p:spPr/>
+        <p:txBody>
+          <a:bodyPr/>
+          <a:lstStyle/>
+          <a:p>
+            <a:r>
+              <a:rPr lang="en-US" dirty="0" smtClean="0"/>
+              <a:t>Controlling Serialization</a:t>
+            </a:r>
+            <a:endParaRPr lang="en-US" dirty="0"/>
+          </a:p>
+        </p:txBody>
+      </p:sp>
+      <p:sp>
+        <p:nvSpPr>
+          <p:cNvPr id="3" name="Content Placeholder 2"/>
+          <p:cNvSpPr>
+            <a:spLocks noGrp="1"/>
+          </p:cNvSpPr>
+          <p:nvPr>
+            <p:ph idx="1"/>
+          </p:nvPr>
+        </p:nvSpPr>
+        <p:spPr/>
+        <p:txBody>
+          <a:bodyPr/>
+          <a:lstStyle/>
+          <a:p>
+            <a:r>
+              <a:rPr lang="en-US" dirty="0" err="1" smtClean="0"/>
+              <a:t>Serializable</a:t>
+            </a:r>
+            <a:endParaRPr lang="en-US" dirty="0" smtClean="0"/>
+          </a:p>
+          <a:p>
+            <a:pPr lvl="1"/>
+            <a:r>
+              <a:rPr lang="en-US" dirty="0" smtClean="0"/>
+              <a:t>Apply to Types</a:t>
+            </a:r>
+          </a:p>
+          <a:p>
+            <a:pPr lvl="1"/>
+            <a:r>
+              <a:rPr lang="en-US" dirty="0" smtClean="0"/>
+              <a:t>Indicates a type can be serialized</a:t>
+            </a:r>
+          </a:p>
+          <a:p>
+            <a:r>
+              <a:rPr lang="en-US" dirty="0" err="1" smtClean="0"/>
+              <a:t>NonSerialized</a:t>
+            </a:r>
+            <a:endParaRPr lang="en-US" dirty="0" smtClean="0"/>
+          </a:p>
+          <a:p>
+            <a:pPr lvl="1"/>
+            <a:r>
+              <a:rPr lang="en-US" dirty="0" smtClean="0"/>
+              <a:t>Apply to Properties</a:t>
+            </a:r>
+            <a:r>
+              <a:rPr lang="en-US" dirty="0"/>
+              <a:t>, </a:t>
+            </a:r>
+            <a:r>
+              <a:rPr lang="en-US" dirty="0" smtClean="0"/>
+              <a:t>Fields</a:t>
+            </a:r>
+          </a:p>
+          <a:p>
+            <a:pPr lvl="1"/>
+            <a:r>
+              <a:rPr lang="en-US" dirty="0" smtClean="0"/>
+              <a:t>Indicates a member should not be serialized</a:t>
+            </a:r>
+          </a:p>
+          <a:p>
+            <a:pPr marL="457200" lvl="1" indent="0">
+              <a:buNone/>
+            </a:pPr>
+            <a:endParaRPr lang="en-US" dirty="0" smtClean="0"/>
+          </a:p>
+          <a:p>
+            <a:pPr marL="457200" lvl="1" indent="0" algn="ctr">
+              <a:buNone/>
+            </a:pPr>
+            <a:r>
+              <a:rPr lang="en-US" dirty="0" smtClean="0"/>
+              <a:t>… and now some more code</a:t>
+            </a:r>
+            <a:endParaRPr lang="en-US" dirty="0"/>
+          </a:p>
+        </p:txBody>
+      </p:sp>
+    </p:spTree>
+    <p:extLst>
+      <p:ext uri="{BB962C8B-B14F-4D97-AF65-F5344CB8AC3E}">
+        <p14:creationId xmlns:p14="http://schemas.microsoft.com/office/powerpoint/2010/main" val="961612886"/>
+      </p:ext>
+    </p:extLst>
+  </p:cSld>
+  <p:clrMapOvr>
+    <a:masterClrMapping/>
+  </p:clrMapOvr>
+</p:sld>
+</file>
+
+<file path=ppt/slides/slide11.xml><?xml version="1.0" encoding="utf-8"?>
+<p:sld xmlns:a="http://schemas.openxmlformats.org/drawingml/2006/main" xmlns:r="http://schemas.openxmlformats.org/officeDocument/2006/relationships" xmlns:p="http://schemas.openxmlformats.org/presentationml/2006/main">
+  <p:cSld>
+    <p:spTree>
+      <p:nvGrpSpPr>
+        <p:cNvPr id="1" name=""/>
+        <p:cNvGrpSpPr/>
+        <p:nvPr/>
+      </p:nvGrpSpPr>
+      <p:grpSpPr>
+        <a:xfrm>
+          <a:off x="0" y="0"/>
+          <a:ext cx="0" cy="0"/>
+          <a:chOff x="0" y="0"/>
+          <a:chExt cx="0" cy="0"/>
+        </a:xfrm>
+      </p:grpSpPr>
+      <p:sp>
+        <p:nvSpPr>
+          <p:cNvPr id="2" name="Title 1"/>
+          <p:cNvSpPr>
+            <a:spLocks noGrp="1"/>
+          </p:cNvSpPr>
+          <p:nvPr>
+            <p:ph type="title"/>
+          </p:nvPr>
+        </p:nvSpPr>
+        <p:spPr/>
+        <p:txBody>
+          <a:bodyPr/>
+          <a:lstStyle/>
+          <a:p>
+            <a:r>
+              <a:rPr lang="en-US" dirty="0" smtClean="0"/>
+              <a:t>De-Serializing</a:t>
+            </a:r>
+            <a:endParaRPr lang="en-US" dirty="0"/>
+          </a:p>
+        </p:txBody>
+      </p:sp>
+      <p:sp>
+        <p:nvSpPr>
+          <p:cNvPr id="3" name="Content Placeholder 2"/>
+          <p:cNvSpPr>
+            <a:spLocks noGrp="1"/>
+          </p:cNvSpPr>
+          <p:nvPr>
+            <p:ph idx="1"/>
+          </p:nvPr>
+        </p:nvSpPr>
+        <p:spPr/>
+        <p:txBody>
+          <a:bodyPr/>
+          <a:lstStyle/>
+          <a:p>
+            <a:pPr marL="0" indent="0">
+              <a:buNone/>
+            </a:pPr>
+            <a:endParaRPr lang="en-US" dirty="0"/>
+          </a:p>
+        </p:txBody>
+      </p:sp>
+    </p:spTree>
+    <p:extLst>
+      <p:ext uri="{BB962C8B-B14F-4D97-AF65-F5344CB8AC3E}">
+        <p14:creationId xmlns:p14="http://schemas.microsoft.com/office/powerpoint/2010/main" val="2194731841"/>
+      </p:ext>
+    </p:extLst>
+  </p:cSld>
+  <p:clrMapOvr>
+    <a:masterClrMapping/>
+  </p:clrMapOvr>
+</p:sld>
+</file>
+
+<file path=ppt/slides/slide12.xml><?xml version="1.0" encoding="utf-8"?>
+<p:sld xmlns:a="http://schemas.openxmlformats.org/drawingml/2006/main" xmlns:r="http://schemas.openxmlformats.org/officeDocument/2006/relationships" xmlns:p="http://schemas.openxmlformats.org/presentationml/2006/main">
+  <p:cSld>
+    <p:spTree>
+      <p:nvGrpSpPr>
+        <p:cNvPr id="1" name=""/>
+        <p:cNvGrpSpPr/>
+        <p:nvPr/>
+      </p:nvGrpSpPr>
+      <p:grpSpPr>
+        <a:xfrm>
+          <a:off x="0" y="0"/>
+          <a:ext cx="0" cy="0"/>
+          <a:chOff x="0" y="0"/>
+          <a:chExt cx="0" cy="0"/>
+        </a:xfrm>
+      </p:grpSpPr>
+      <p:sp>
+        <p:nvSpPr>
+          <p:cNvPr id="2" name="Title 1"/>
+          <p:cNvSpPr>
+            <a:spLocks noGrp="1"/>
+          </p:cNvSpPr>
+          <p:nvPr>
+            <p:ph type="title"/>
+          </p:nvPr>
+        </p:nvSpPr>
+        <p:spPr/>
+        <p:txBody>
+          <a:bodyPr/>
+          <a:lstStyle/>
+          <a:p>
+            <a:r>
+              <a:rPr lang="en-US" dirty="0" smtClean="0"/>
+              <a:t>Customizing Serialization</a:t>
+            </a:r>
+            <a:endParaRPr lang="en-US" dirty="0"/>
+          </a:p>
+        </p:txBody>
+      </p:sp>
+      <p:sp>
+        <p:nvSpPr>
+          <p:cNvPr id="3" name="Content Placeholder 2"/>
+          <p:cNvSpPr>
+            <a:spLocks noGrp="1"/>
+          </p:cNvSpPr>
+          <p:nvPr>
+            <p:ph idx="1"/>
+          </p:nvPr>
+        </p:nvSpPr>
+        <p:spPr/>
+        <p:txBody>
+          <a:bodyPr/>
+          <a:lstStyle/>
+          <a:p>
+            <a:endParaRPr lang="en-US"/>
+          </a:p>
+        </p:txBody>
+      </p:sp>
+    </p:spTree>
+    <p:extLst>
+      <p:ext uri="{BB962C8B-B14F-4D97-AF65-F5344CB8AC3E}">
+        <p14:creationId xmlns:p14="http://schemas.microsoft.com/office/powerpoint/2010/main" val="1475299107"/>
+      </p:ext>
+    </p:extLst>
+  </p:cSld>
+  <p:clrMapOvr>
+    <a:masterClrMapping/>
+  </p:clrMapOvr>
+</p:sld>
+</file>
+
 <file path=ppt/slides/slide2.xml><?xml version="1.0" encoding="utf-8"?>
 <p:sld xmlns:a="http://schemas.openxmlformats.org/drawingml/2006/main" xmlns:r="http://schemas.openxmlformats.org/officeDocument/2006/relationships" xmlns:p="http://schemas.openxmlformats.org/presentationml/2006/main">
   <p:cSld>
@@ -25722,55 +26007,61 @@
           <a:lstStyle/>
           <a:p>
             <a:r>
-              <a:rPr lang="en-US" dirty="0" smtClean="0"/>
+              <a:rPr lang="en-US" sz="2800" dirty="0" smtClean="0"/>
               <a:t>What is Serialization</a:t>
             </a:r>
           </a:p>
           <a:p>
             <a:r>
-              <a:rPr lang="en-US" dirty="0" smtClean="0"/>
+              <a:rPr lang="en-US" sz="2800" dirty="0" smtClean="0"/>
               <a:t>What is Serialization Used For</a:t>
             </a:r>
           </a:p>
           <a:p>
             <a:r>
-              <a:rPr lang="en-US" dirty="0" smtClean="0"/>
+              <a:rPr lang="en-US" sz="2800" dirty="0" smtClean="0"/>
               <a:t>How Serialization Works</a:t>
             </a:r>
-            <a:endParaRPr lang="en-US" dirty="0" smtClean="0"/>
+            <a:endParaRPr lang="en-US" sz="2800" dirty="0" smtClean="0"/>
           </a:p>
           <a:p>
             <a:r>
-              <a:rPr lang="en-US" dirty="0" smtClean="0"/>
+              <a:rPr lang="en-US" sz="2800" dirty="0" smtClean="0"/>
               <a:t>Available Serializers</a:t>
             </a:r>
           </a:p>
           <a:p>
             <a:r>
-              <a:rPr lang="en-US" dirty="0" smtClean="0"/>
+              <a:rPr lang="en-US" sz="2800" dirty="0" smtClean="0"/>
               <a:t>Examples of use</a:t>
             </a:r>
           </a:p>
           <a:p>
             <a:r>
-              <a:rPr lang="en-US" dirty="0" smtClean="0"/>
+              <a:rPr lang="en-US" sz="2800" dirty="0" smtClean="0"/>
+              <a:t>Attributes</a:t>
+            </a:r>
+          </a:p>
+          <a:p>
+            <a:r>
+              <a:rPr lang="en-US" sz="2800" dirty="0" smtClean="0"/>
               <a:t>Customizing Serialization</a:t>
             </a:r>
           </a:p>
           <a:p>
             <a:r>
-              <a:rPr lang="en-US" dirty="0" smtClean="0"/>
+              <a:rPr lang="en-US" sz="2800" dirty="0" smtClean="0"/>
               <a:t>Versioning</a:t>
             </a:r>
           </a:p>
           <a:p>
             <a:r>
-              <a:rPr lang="en-US" dirty="0" smtClean="0"/>
+              <a:rPr lang="en-US" sz="2800" dirty="0" smtClean="0"/>
               <a:t>Unit Testing</a:t>
             </a:r>
           </a:p>
           <a:p>
-            <a:endParaRPr lang="en-US" dirty="0" smtClean="0"/>
+            <a:endParaRPr lang="en-US" sz="2800" dirty="0" smtClean="0"/>
           </a:p>
         </p:txBody>
       </p:sp>
@@ -25898,6 +26189,116 @@
 </file>
 
 <file path=ppt/slides/slide5.xml><?xml version="1.0" encoding="utf-8"?>
+<p:sld xmlns:a="http://schemas.openxmlformats.org/drawingml/2006/main" xmlns:r="http://schemas.openxmlformats.org/officeDocument/2006/relationships" xmlns:p="http://schemas.openxmlformats.org/presentationml/2006/main">
+  <p:cSld>
+    <p:spTree>
+      <p:nvGrpSpPr>
+        <p:cNvPr id="1" name=""/>
+        <p:cNvGrpSpPr/>
+        <p:nvPr/>
+      </p:nvGrpSpPr>
+      <p:grpSpPr>
+        <a:xfrm>
+          <a:off x="0" y="0"/>
+          <a:ext cx="0" cy="0"/>
+          <a:chOff x="0" y="0"/>
+          <a:chExt cx="0" cy="0"/>
+        </a:xfrm>
+      </p:grpSpPr>
+      <p:sp>
+        <p:nvSpPr>
+          <p:cNvPr id="2" name="Title 1"/>
+          <p:cNvSpPr>
+            <a:spLocks noGrp="1"/>
+          </p:cNvSpPr>
+          <p:nvPr>
+            <p:ph type="title"/>
+          </p:nvPr>
+        </p:nvSpPr>
+        <p:spPr/>
+        <p:txBody>
+          <a:bodyPr/>
+          <a:lstStyle/>
+          <a:p>
+            <a:r>
+              <a:rPr lang="en-US" dirty="0" smtClean="0"/>
+              <a:t>Uses</a:t>
+            </a:r>
+            <a:endParaRPr lang="en-US" dirty="0"/>
+          </a:p>
+        </p:txBody>
+      </p:sp>
+      <p:sp>
+        <p:nvSpPr>
+          <p:cNvPr id="3" name="Content Placeholder 2"/>
+          <p:cNvSpPr>
+            <a:spLocks noGrp="1"/>
+          </p:cNvSpPr>
+          <p:nvPr>
+            <p:ph idx="1"/>
+          </p:nvPr>
+        </p:nvSpPr>
+        <p:spPr/>
+        <p:txBody>
+          <a:bodyPr/>
+          <a:lstStyle/>
+          <a:p>
+            <a:r>
+              <a:rPr lang="en-US" dirty="0" smtClean="0"/>
+              <a:t>Exchange .NET objects</a:t>
+            </a:r>
+          </a:p>
+          <a:p>
+            <a:pPr lvl="1"/>
+            <a:r>
+              <a:rPr lang="en-US" dirty="0" smtClean="0"/>
+              <a:t>Two .NET Applications</a:t>
+            </a:r>
+          </a:p>
+          <a:p>
+            <a:pPr lvl="1"/>
+            <a:r>
+              <a:rPr lang="en-US" dirty="0" smtClean="0"/>
+              <a:t>.NET Application Layers – loosely connected</a:t>
+            </a:r>
+          </a:p>
+          <a:p>
+            <a:pPr lvl="1"/>
+            <a:r>
+              <a:rPr lang="en-US" dirty="0" smtClean="0"/>
+              <a:t>Non-.NET applications</a:t>
+            </a:r>
+          </a:p>
+          <a:p>
+            <a:r>
+              <a:rPr lang="en-US" dirty="0" smtClean="0"/>
+              <a:t>Storage of .NET object states</a:t>
+            </a:r>
+          </a:p>
+          <a:p>
+            <a:pPr lvl="1"/>
+            <a:r>
+              <a:rPr lang="en-US" dirty="0" smtClean="0"/>
+              <a:t>To file or database</a:t>
+            </a:r>
+            <a:endParaRPr lang="en-US" dirty="0"/>
+          </a:p>
+        </p:txBody>
+      </p:sp>
+    </p:spTree>
+    <p:extLst>
+      <p:ext uri="{BB962C8B-B14F-4D97-AF65-F5344CB8AC3E}">
+        <p14:creationId xmlns:p14="http://schemas.microsoft.com/office/powerpoint/2010/main" val="618115814"/>
+      </p:ext>
+    </p:extLst>
+  </p:cSld>
+  <p:clrMapOvr>
+    <a:masterClrMapping/>
+  </p:clrMapOvr>
+</p:sld>
+</file>
+
+<file path=ppt/slides/slide6.xml><?xml version="1.0" encoding="utf-8"?>
 <p:sld xmlns:a="http://schemas.openxmlformats.org/drawingml/2006/main" xmlns:r="http://schemas.openxmlformats.org/officeDocument/2006/relationships" xmlns:p="http://schemas.openxmlformats.org/presentationml/2006/main">
   <p:cSld>
     <p:spTree>
@@ -26959,7 +27360,7 @@
 </p:sld>
 </file>
 
-<file path=ppt/slides/slide6.xml><?xml version="1.0" encoding="utf-8"?>
+<file path=ppt/slides/slide7.xml><?xml version="1.0" encoding="utf-8"?>
 <p:sld xmlns:a="http://schemas.openxmlformats.org/drawingml/2006/main" xmlns:r="http://schemas.openxmlformats.org/officeDocument/2006/relationships" xmlns:p="http://schemas.openxmlformats.org/presentationml/2006/main">
   <p:cSld>
     <p:spTree>
@@ -27118,7 +27519,7 @@
 </p:sld>
 </file>
 
-<file path=ppt/slides/slide7.xml><?xml version="1.0" encoding="utf-8"?>
+<file path=ppt/slides/slide8.xml><?xml version="1.0" encoding="utf-8"?>
 <p:sld xmlns:a="http://schemas.openxmlformats.org/drawingml/2006/main" xmlns:r="http://schemas.openxmlformats.org/officeDocument/2006/relationships" xmlns:p="http://schemas.openxmlformats.org/presentationml/2006/main">
   <p:cSld>
     <p:spTree>
@@ -27209,7 +27610,7 @@
 </p:sld>
 </file>
 
-<file path=ppt/slides/slide8.xml><?xml version="1.0" encoding="utf-8"?>
+<file path=ppt/slides/slide9.xml><?xml version="1.0" encoding="utf-8"?>
 <p:sld xmlns:a="http://schemas.openxmlformats.org/drawingml/2006/main" xmlns:r="http://schemas.openxmlformats.org/officeDocument/2006/relationships" xmlns:p="http://schemas.openxmlformats.org/presentationml/2006/main">
   <p:cSld>
     <p:spTree>
@@ -27321,126 +27722,6 @@
     <p:extLst>
       <p:ext uri="{BB962C8B-B14F-4D97-AF65-F5344CB8AC3E}">
         <p14:creationId xmlns:p14="http://schemas.microsoft.com/office/powerpoint/2010/main" val="1697173030"/>
-      </p:ext>
-    </p:extLst>
-  </p:cSld>
-  <p:clrMapOvr>
-    <a:masterClrMapping/>
-  </p:clrMapOvr>
-</p:sld>
-</file>
-
-<file path=ppt/slides/slide9.xml><?xml version="1.0" encoding="utf-8"?>
-<p:sld xmlns:a="http://schemas.openxmlformats.org/drawingml/2006/main" xmlns:r="http://schemas.openxmlformats.org/officeDocument/2006/relationships" xmlns:p="http://schemas.openxmlformats.org/presentationml/2006/main">
-  <p:cSld>
-    <p:spTree>
-      <p:nvGrpSpPr>
-        <p:cNvPr id="1" name=""/>
-        <p:cNvGrpSpPr/>
-        <p:nvPr/>
-      </p:nvGrpSpPr>
-      <p:grpSpPr>
-        <a:xfrm>
-          <a:off x="0" y="0"/>
-          <a:ext cx="0" cy="0"/>
-          <a:chOff x="0" y="0"/>
-          <a:chExt cx="0" cy="0"/>
-        </a:xfrm>
-      </p:grpSpPr>
-      <p:sp>
-        <p:nvSpPr>
-          <p:cNvPr id="2" name="Title 1"/>
-          <p:cNvSpPr>
-            <a:spLocks noGrp="1"/>
-          </p:cNvSpPr>
-          <p:nvPr>
-            <p:ph type="title"/>
-          </p:nvPr>
-        </p:nvSpPr>
-        <p:spPr/>
-        <p:txBody>
-          <a:bodyPr/>
-          <a:lstStyle/>
-          <a:p>
-            <a:r>
-              <a:rPr lang="en-US" dirty="0" smtClean="0"/>
-              <a:t>Attributes</a:t>
-            </a:r>
-            <a:endParaRPr lang="en-US" dirty="0"/>
-          </a:p>
-        </p:txBody>
-      </p:sp>
-      <p:sp>
-        <p:nvSpPr>
-          <p:cNvPr id="3" name="Content Placeholder 2"/>
-          <p:cNvSpPr>
-            <a:spLocks noGrp="1"/>
-          </p:cNvSpPr>
-          <p:nvPr>
-            <p:ph idx="1"/>
-          </p:nvPr>
-        </p:nvSpPr>
-        <p:spPr/>
-        <p:txBody>
-          <a:bodyPr/>
-          <a:lstStyle/>
-          <a:p>
-            <a:r>
-              <a:rPr lang="en-US" dirty="0" err="1" smtClean="0"/>
-              <a:t>Serializable</a:t>
-            </a:r>
-            <a:endParaRPr lang="en-US" dirty="0" smtClean="0"/>
-          </a:p>
-          <a:p>
-            <a:pPr lvl="1"/>
-            <a:r>
-              <a:rPr lang="en-US" dirty="0" smtClean="0"/>
-              <a:t>Apply to Types</a:t>
-            </a:r>
-          </a:p>
-          <a:p>
-            <a:pPr lvl="1"/>
-            <a:r>
-              <a:rPr lang="en-US" dirty="0" smtClean="0"/>
-              <a:t>Indicates a type can be serialized</a:t>
-            </a:r>
-          </a:p>
-          <a:p>
-            <a:r>
-              <a:rPr lang="en-US" dirty="0" err="1" smtClean="0"/>
-              <a:t>NonSerialized</a:t>
-            </a:r>
-            <a:endParaRPr lang="en-US" dirty="0" smtClean="0"/>
-          </a:p>
-          <a:p>
-            <a:pPr lvl="1"/>
-            <a:r>
-              <a:rPr lang="en-US" dirty="0" smtClean="0"/>
-              <a:t>Apply to Properties</a:t>
-            </a:r>
-            <a:r>
-              <a:rPr lang="en-US" dirty="0"/>
-              <a:t>, </a:t>
-            </a:r>
-            <a:r>
-              <a:rPr lang="en-US" dirty="0" smtClean="0"/>
-              <a:t>Fields</a:t>
-            </a:r>
-          </a:p>
-          <a:p>
-            <a:pPr lvl="1"/>
-            <a:r>
-              <a:rPr lang="en-US" dirty="0" smtClean="0"/>
-              <a:t>Indicates a member should not be serialized</a:t>
-            </a:r>
-            <a:endParaRPr lang="en-US" dirty="0"/>
-          </a:p>
-        </p:txBody>
-      </p:sp>
-    </p:spTree>
-    <p:extLst>
-      <p:ext uri="{BB962C8B-B14F-4D97-AF65-F5344CB8AC3E}">
-        <p14:creationId xmlns:p14="http://schemas.microsoft.com/office/powerpoint/2010/main" val="961612886"/>
       </p:ext>
     </p:extLst>
   </p:cSld>

</xml_diff>

<commit_message>
Includes example with XmlInclude
</commit_message>
<xml_diff>
--- a/.NET Serialization.pptx
+++ b/.NET Serialization.pptx
@@ -16,7 +16,9 @@
     <p:sldId id="276" r:id="rId10"/>
     <p:sldId id="277" r:id="rId11"/>
     <p:sldId id="281" r:id="rId12"/>
-    <p:sldId id="280" r:id="rId13"/>
+    <p:sldId id="282" r:id="rId13"/>
+    <p:sldId id="283" r:id="rId14"/>
+    <p:sldId id="280" r:id="rId15"/>
   </p:sldIdLst>
   <p:sldSz cx="9144000" cy="6858000" type="screen4x3"/>
   <p:notesSz cx="6858000" cy="9144000"/>
@@ -25726,7 +25728,7 @@
       </p:sp>
       <p:sp>
         <p:nvSpPr>
-          <p:cNvPr id="3" name="Content Placeholder 2"/>
+          <p:cNvPr id="4" name="Content Placeholder 2"/>
           <p:cNvSpPr>
             <a:spLocks noGrp="1"/>
           </p:cNvSpPr>
@@ -25734,14 +25736,35 @@
             <p:ph idx="1"/>
           </p:nvPr>
         </p:nvSpPr>
-        <p:spPr/>
+        <p:spPr>
+          <a:xfrm>
+            <a:off x="457200" y="1600200"/>
+            <a:ext cx="8229600" cy="4533900"/>
+          </a:xfrm>
+        </p:spPr>
         <p:txBody>
           <a:bodyPr/>
           <a:lstStyle/>
           <a:p>
-            <a:pPr marL="0" indent="0">
+            <a:pPr marL="0" indent="0" algn="ctr">
               <a:buNone/>
             </a:pPr>
+            <a:endParaRPr lang="en-US" dirty="0" smtClean="0"/>
+          </a:p>
+          <a:p>
+            <a:pPr marL="0" indent="0" algn="ctr">
+              <a:buNone/>
+            </a:pPr>
+            <a:endParaRPr lang="en-US" dirty="0"/>
+          </a:p>
+          <a:p>
+            <a:pPr marL="0" indent="0" algn="ctr">
+              <a:buNone/>
+            </a:pPr>
+            <a:r>
+              <a:rPr lang="en-US" dirty="0" smtClean="0"/>
+              <a:t>Okay, code again…</a:t>
+            </a:r>
             <a:endParaRPr lang="en-US" dirty="0"/>
           </a:p>
         </p:txBody>
@@ -25793,7 +25816,7 @@
           <a:p>
             <a:r>
               <a:rPr lang="en-US" dirty="0" smtClean="0"/>
-              <a:t>Customizing Serialization</a:t>
+              <a:t>We Need More Control</a:t>
             </a:r>
             <a:endParaRPr lang="en-US" dirty="0"/>
           </a:p>
@@ -25814,7 +25837,276 @@
           <a:bodyPr/>
           <a:lstStyle/>
           <a:p>
-            <a:endParaRPr lang="en-US"/>
+            <a:r>
+              <a:rPr lang="en-US" dirty="0" smtClean="0"/>
+              <a:t>Attributes</a:t>
+            </a:r>
+          </a:p>
+          <a:p>
+            <a:pPr lvl="1"/>
+            <a:r>
+              <a:rPr lang="en-US" dirty="0" err="1" smtClean="0"/>
+              <a:t>OnSerializing</a:t>
+            </a:r>
+            <a:r>
+              <a:rPr lang="en-US" dirty="0" smtClean="0"/>
+              <a:t>, </a:t>
+            </a:r>
+            <a:r>
+              <a:rPr lang="en-US" dirty="0" err="1" smtClean="0"/>
+              <a:t>OnSerialized</a:t>
+            </a:r>
+            <a:endParaRPr lang="en-US" dirty="0" smtClean="0"/>
+          </a:p>
+          <a:p>
+            <a:pPr lvl="1"/>
+            <a:r>
+              <a:rPr lang="en-US" dirty="0" err="1" smtClean="0"/>
+              <a:t>OnDeserializing</a:t>
+            </a:r>
+            <a:r>
+              <a:rPr lang="en-US" dirty="0" smtClean="0"/>
+              <a:t>, </a:t>
+            </a:r>
+            <a:r>
+              <a:rPr lang="en-US" dirty="0" err="1" smtClean="0"/>
+              <a:t>OnDeserialized</a:t>
+            </a:r>
+            <a:endParaRPr lang="en-US" dirty="0" smtClean="0"/>
+          </a:p>
+          <a:p>
+            <a:pPr lvl="1"/>
+            <a:r>
+              <a:rPr lang="en-US" dirty="0" smtClean="0"/>
+              <a:t>Use with </a:t>
+            </a:r>
+          </a:p>
+          <a:p>
+            <a:pPr lvl="2"/>
+            <a:r>
+              <a:rPr lang="en-US" dirty="0" err="1" smtClean="0"/>
+              <a:t>BinaryFormatter</a:t>
+            </a:r>
+            <a:endParaRPr lang="en-US" dirty="0" smtClean="0"/>
+          </a:p>
+          <a:p>
+            <a:pPr lvl="2"/>
+            <a:r>
+              <a:rPr lang="en-US" dirty="0" smtClean="0"/>
+              <a:t>WCF </a:t>
+            </a:r>
+            <a:r>
+              <a:rPr lang="en-US" dirty="0" err="1" smtClean="0"/>
+              <a:t>serializers</a:t>
+            </a:r>
+            <a:endParaRPr lang="en-US" dirty="0" smtClean="0"/>
+          </a:p>
+          <a:p>
+            <a:pPr lvl="2"/>
+            <a:r>
+              <a:rPr lang="en-US" dirty="0" smtClean="0"/>
+              <a:t>JSON.NET</a:t>
+            </a:r>
+            <a:endParaRPr lang="en-US" dirty="0"/>
+          </a:p>
+        </p:txBody>
+      </p:sp>
+    </p:spTree>
+    <p:extLst>
+      <p:ext uri="{BB962C8B-B14F-4D97-AF65-F5344CB8AC3E}">
+        <p14:creationId xmlns:p14="http://schemas.microsoft.com/office/powerpoint/2010/main" val="644050858"/>
+      </p:ext>
+    </p:extLst>
+  </p:cSld>
+  <p:clrMapOvr>
+    <a:masterClrMapping/>
+  </p:clrMapOvr>
+</p:sld>
+</file>
+
+<file path=ppt/slides/slide13.xml><?xml version="1.0" encoding="utf-8"?>
+<p:sld xmlns:a="http://schemas.openxmlformats.org/drawingml/2006/main" xmlns:r="http://schemas.openxmlformats.org/officeDocument/2006/relationships" xmlns:p="http://schemas.openxmlformats.org/presentationml/2006/main">
+  <p:cSld>
+    <p:spTree>
+      <p:nvGrpSpPr>
+        <p:cNvPr id="1" name=""/>
+        <p:cNvGrpSpPr/>
+        <p:nvPr/>
+      </p:nvGrpSpPr>
+      <p:grpSpPr>
+        <a:xfrm>
+          <a:off x="0" y="0"/>
+          <a:ext cx="0" cy="0"/>
+          <a:chOff x="0" y="0"/>
+          <a:chExt cx="0" cy="0"/>
+        </a:xfrm>
+      </p:grpSpPr>
+      <p:sp>
+        <p:nvSpPr>
+          <p:cNvPr id="2" name="Title 1"/>
+          <p:cNvSpPr>
+            <a:spLocks noGrp="1"/>
+          </p:cNvSpPr>
+          <p:nvPr>
+            <p:ph type="title"/>
+          </p:nvPr>
+        </p:nvSpPr>
+        <p:spPr/>
+        <p:txBody>
+          <a:bodyPr/>
+          <a:lstStyle/>
+          <a:p>
+            <a:r>
+              <a:rPr lang="en-US" dirty="0" smtClean="0"/>
+              <a:t>Help for XML Serializer</a:t>
+            </a:r>
+            <a:endParaRPr lang="en-US" dirty="0"/>
+          </a:p>
+        </p:txBody>
+      </p:sp>
+      <p:sp>
+        <p:nvSpPr>
+          <p:cNvPr id="3" name="Content Placeholder 2"/>
+          <p:cNvSpPr>
+            <a:spLocks noGrp="1"/>
+          </p:cNvSpPr>
+          <p:nvPr>
+            <p:ph idx="1"/>
+          </p:nvPr>
+        </p:nvSpPr>
+        <p:spPr/>
+        <p:txBody>
+          <a:bodyPr/>
+          <a:lstStyle/>
+          <a:p>
+            <a:r>
+              <a:rPr lang="en-US" dirty="0" err="1" smtClean="0"/>
+              <a:t>XmlInclude</a:t>
+            </a:r>
+            <a:r>
+              <a:rPr lang="en-US" dirty="0" smtClean="0"/>
+              <a:t> Attribute</a:t>
+            </a:r>
+          </a:p>
+          <a:p>
+            <a:pPr lvl="1"/>
+            <a:r>
+              <a:rPr lang="en-US" dirty="0" smtClean="0"/>
+              <a:t>Includes definition of additional types</a:t>
+            </a:r>
+          </a:p>
+          <a:p>
+            <a:pPr lvl="1"/>
+            <a:r>
+              <a:rPr lang="en-US" dirty="0" smtClean="0"/>
+              <a:t>Needed for types not directly specified</a:t>
+            </a:r>
+          </a:p>
+          <a:p>
+            <a:pPr lvl="1"/>
+            <a:endParaRPr lang="en-US" dirty="0" smtClean="0"/>
+          </a:p>
+        </p:txBody>
+      </p:sp>
+    </p:spTree>
+    <p:extLst>
+      <p:ext uri="{BB962C8B-B14F-4D97-AF65-F5344CB8AC3E}">
+        <p14:creationId xmlns:p14="http://schemas.microsoft.com/office/powerpoint/2010/main" val="2901253027"/>
+      </p:ext>
+    </p:extLst>
+  </p:cSld>
+  <p:clrMapOvr>
+    <a:masterClrMapping/>
+  </p:clrMapOvr>
+</p:sld>
+</file>
+
+<file path=ppt/slides/slide14.xml><?xml version="1.0" encoding="utf-8"?>
+<p:sld xmlns:a="http://schemas.openxmlformats.org/drawingml/2006/main" xmlns:r="http://schemas.openxmlformats.org/officeDocument/2006/relationships" xmlns:p="http://schemas.openxmlformats.org/presentationml/2006/main">
+  <p:cSld>
+    <p:spTree>
+      <p:nvGrpSpPr>
+        <p:cNvPr id="1" name=""/>
+        <p:cNvGrpSpPr/>
+        <p:nvPr/>
+      </p:nvGrpSpPr>
+      <p:grpSpPr>
+        <a:xfrm>
+          <a:off x="0" y="0"/>
+          <a:ext cx="0" cy="0"/>
+          <a:chOff x="0" y="0"/>
+          <a:chExt cx="0" cy="0"/>
+        </a:xfrm>
+      </p:grpSpPr>
+      <p:sp>
+        <p:nvSpPr>
+          <p:cNvPr id="2" name="Title 1"/>
+          <p:cNvSpPr>
+            <a:spLocks noGrp="1"/>
+          </p:cNvSpPr>
+          <p:nvPr>
+            <p:ph type="title"/>
+          </p:nvPr>
+        </p:nvSpPr>
+        <p:spPr/>
+        <p:txBody>
+          <a:bodyPr/>
+          <a:lstStyle/>
+          <a:p>
+            <a:r>
+              <a:rPr lang="en-US" dirty="0" smtClean="0"/>
+              <a:t>Customizing Serialization</a:t>
+            </a:r>
+            <a:br>
+              <a:rPr lang="en-US" dirty="0" smtClean="0"/>
+            </a:br>
+            <a:r>
+              <a:rPr lang="en-US" dirty="0" smtClean="0"/>
+              <a:t>Ultimate Control</a:t>
+            </a:r>
+            <a:endParaRPr lang="en-US" dirty="0"/>
+          </a:p>
+        </p:txBody>
+      </p:sp>
+      <p:sp>
+        <p:nvSpPr>
+          <p:cNvPr id="3" name="Content Placeholder 2"/>
+          <p:cNvSpPr>
+            <a:spLocks noGrp="1"/>
+          </p:cNvSpPr>
+          <p:nvPr>
+            <p:ph idx="1"/>
+          </p:nvPr>
+        </p:nvSpPr>
+        <p:spPr/>
+        <p:txBody>
+          <a:bodyPr/>
+          <a:lstStyle/>
+          <a:p>
+            <a:r>
+              <a:rPr lang="en-US" dirty="0" err="1" smtClean="0"/>
+              <a:t>ISerializable</a:t>
+            </a:r>
+            <a:endParaRPr lang="en-US" dirty="0" smtClean="0"/>
+          </a:p>
+          <a:p>
+            <a:pPr lvl="1"/>
+            <a:r>
+              <a:rPr lang="en-US" dirty="0" smtClean="0"/>
+              <a:t>Deserialization constructor</a:t>
+            </a:r>
+          </a:p>
+          <a:p>
+            <a:pPr lvl="1"/>
+            <a:r>
+              <a:rPr lang="en-US" dirty="0" err="1" smtClean="0"/>
+              <a:t>GetObjectData</a:t>
+            </a:r>
+            <a:r>
+              <a:rPr lang="en-US" dirty="0" smtClean="0"/>
+              <a:t> method</a:t>
+            </a:r>
+            <a:endParaRPr lang="en-US" dirty="0"/>
           </a:p>
         </p:txBody>
       </p:sp>

</xml_diff>

<commit_message>
Notes on Xml custom serialization
</commit_message>
<xml_diff>
--- a/.NET Serialization.pptx
+++ b/.NET Serialization.pptx
@@ -26106,6 +26106,56 @@
               <a:rPr lang="en-US" dirty="0" smtClean="0"/>
               <a:t> method</a:t>
             </a:r>
+          </a:p>
+          <a:p>
+            <a:pPr lvl="2"/>
+            <a:endParaRPr lang="en-US" dirty="0" smtClean="0"/>
+          </a:p>
+          <a:p>
+            <a:r>
+              <a:rPr lang="en-US" dirty="0" err="1" smtClean="0"/>
+              <a:t>IXmlSerializable</a:t>
+            </a:r>
+            <a:endParaRPr lang="en-US" dirty="0" smtClean="0"/>
+          </a:p>
+          <a:p>
+            <a:pPr lvl="1"/>
+            <a:r>
+              <a:rPr lang="en-US" dirty="0" err="1" smtClean="0"/>
+              <a:t>ReadXml</a:t>
+            </a:r>
+            <a:endParaRPr lang="en-US" dirty="0" smtClean="0"/>
+          </a:p>
+          <a:p>
+            <a:pPr lvl="1"/>
+            <a:r>
+              <a:rPr lang="en-US" dirty="0" err="1" smtClean="0"/>
+              <a:t>WriteXml</a:t>
+            </a:r>
+            <a:endParaRPr lang="en-US" dirty="0" smtClean="0"/>
+          </a:p>
+          <a:p>
+            <a:pPr lvl="1"/>
+            <a:r>
+              <a:rPr lang="en-US" dirty="0" err="1" smtClean="0"/>
+              <a:t>GetSchema</a:t>
+            </a:r>
+            <a:r>
+              <a:rPr lang="en-US" dirty="0" smtClean="0"/>
+              <a:t> – </a:t>
+            </a:r>
+            <a:r>
+              <a:rPr lang="en-US" dirty="0" err="1" smtClean="0"/>
+              <a:t>Nop</a:t>
+            </a:r>
+            <a:r>
+              <a:rPr lang="en-US" dirty="0" smtClean="0"/>
+              <a:t> – just return null</a:t>
+            </a:r>
+            <a:endParaRPr lang="en-US" dirty="0"/>
+          </a:p>
+          <a:p>
+            <a:pPr lvl="2"/>
             <a:endParaRPr lang="en-US" dirty="0"/>
           </a:p>
         </p:txBody>

</xml_diff>

<commit_message>
Versioning stuff in place
</commit_message>
<xml_diff>
--- a/.NET Serialization.pptx
+++ b/.NET Serialization.pptx
@@ -19,6 +19,10 @@
     <p:sldId id="282" r:id="rId13"/>
     <p:sldId id="283" r:id="rId14"/>
     <p:sldId id="280" r:id="rId15"/>
+    <p:sldId id="284" r:id="rId16"/>
+    <p:sldId id="285" r:id="rId17"/>
+    <p:sldId id="286" r:id="rId18"/>
+    <p:sldId id="287" r:id="rId19"/>
   </p:sldIdLst>
   <p:sldSz cx="9144000" cy="6858000" type="screen4x3"/>
   <p:notesSz cx="6858000" cy="9144000"/>
@@ -25893,13 +25897,8 @@
             <a:pPr lvl="2"/>
             <a:r>
               <a:rPr lang="en-US" dirty="0" smtClean="0"/>
-              <a:t>WCF </a:t>
+              <a:t>WCF serializers</a:t>
             </a:r>
-            <a:r>
-              <a:rPr lang="en-US" dirty="0" err="1" smtClean="0"/>
-              <a:t>serializers</a:t>
-            </a:r>
-            <a:endParaRPr lang="en-US" dirty="0" smtClean="0"/>
           </a:p>
           <a:p>
             <a:pPr lvl="2"/>
@@ -26164,6 +26163,463 @@
     <p:extLst>
       <p:ext uri="{BB962C8B-B14F-4D97-AF65-F5344CB8AC3E}">
         <p14:creationId xmlns:p14="http://schemas.microsoft.com/office/powerpoint/2010/main" val="1475299107"/>
+      </p:ext>
+    </p:extLst>
+  </p:cSld>
+  <p:clrMapOvr>
+    <a:masterClrMapping/>
+  </p:clrMapOvr>
+</p:sld>
+</file>
+
+<file path=ppt/slides/slide15.xml><?xml version="1.0" encoding="utf-8"?>
+<p:sld xmlns:a="http://schemas.openxmlformats.org/drawingml/2006/main" xmlns:r="http://schemas.openxmlformats.org/officeDocument/2006/relationships" xmlns:p="http://schemas.openxmlformats.org/presentationml/2006/main">
+  <p:cSld>
+    <p:spTree>
+      <p:nvGrpSpPr>
+        <p:cNvPr id="1" name=""/>
+        <p:cNvGrpSpPr/>
+        <p:nvPr/>
+      </p:nvGrpSpPr>
+      <p:grpSpPr>
+        <a:xfrm>
+          <a:off x="0" y="0"/>
+          <a:ext cx="0" cy="0"/>
+          <a:chOff x="0" y="0"/>
+          <a:chExt cx="0" cy="0"/>
+        </a:xfrm>
+      </p:grpSpPr>
+      <p:sp>
+        <p:nvSpPr>
+          <p:cNvPr id="2" name="Title 1"/>
+          <p:cNvSpPr>
+            <a:spLocks noGrp="1"/>
+          </p:cNvSpPr>
+          <p:nvPr>
+            <p:ph type="title"/>
+          </p:nvPr>
+        </p:nvSpPr>
+        <p:spPr/>
+        <p:txBody>
+          <a:bodyPr/>
+          <a:lstStyle/>
+          <a:p>
+            <a:r>
+              <a:rPr lang="en-US" dirty="0" smtClean="0"/>
+              <a:t>Versioning</a:t>
+            </a:r>
+            <a:endParaRPr lang="en-US" dirty="0"/>
+          </a:p>
+        </p:txBody>
+      </p:sp>
+      <p:sp>
+        <p:nvSpPr>
+          <p:cNvPr id="3" name="Content Placeholder 2"/>
+          <p:cNvSpPr>
+            <a:spLocks noGrp="1"/>
+          </p:cNvSpPr>
+          <p:nvPr>
+            <p:ph idx="1"/>
+          </p:nvPr>
+        </p:nvSpPr>
+        <p:spPr>
+          <a:xfrm>
+            <a:off x="228600" y="1600200"/>
+            <a:ext cx="8763000" cy="4533900"/>
+          </a:xfrm>
+        </p:spPr>
+        <p:txBody>
+          <a:bodyPr/>
+          <a:lstStyle/>
+          <a:p>
+            <a:r>
+              <a:rPr lang="en-US" dirty="0" smtClean="0"/>
+              <a:t>.NET 2.0 added version tolerance to BF</a:t>
+            </a:r>
+          </a:p>
+          <a:p>
+            <a:pPr lvl="1"/>
+            <a:r>
+              <a:rPr lang="en-US" dirty="0" smtClean="0"/>
+              <a:t>Add new fields without breaking deserialization</a:t>
+            </a:r>
+          </a:p>
+          <a:p>
+            <a:pPr lvl="1"/>
+            <a:r>
+              <a:rPr lang="en-US" dirty="0" smtClean="0"/>
+              <a:t>Additional fields in stream ignored during deserialization</a:t>
+            </a:r>
+          </a:p>
+          <a:p>
+            <a:pPr lvl="1"/>
+            <a:r>
+              <a:rPr lang="en-US" dirty="0" smtClean="0"/>
+              <a:t>Attribute fields as </a:t>
+            </a:r>
+            <a:r>
+              <a:rPr lang="en-US" dirty="0" err="1" smtClean="0"/>
+              <a:t>OptionalField</a:t>
+            </a:r>
+            <a:endParaRPr lang="en-US" dirty="0" smtClean="0"/>
+          </a:p>
+          <a:p>
+            <a:pPr lvl="2"/>
+            <a:r>
+              <a:rPr lang="en-US" dirty="0" smtClean="0"/>
+              <a:t>Set </a:t>
+            </a:r>
+            <a:r>
+              <a:rPr lang="en-US" dirty="0" err="1" smtClean="0"/>
+              <a:t>VersionAdded</a:t>
+            </a:r>
+            <a:r>
+              <a:rPr lang="en-US" dirty="0" smtClean="0"/>
+              <a:t> </a:t>
+            </a:r>
+            <a:r>
+              <a:rPr lang="en-US" dirty="0" err="1" smtClean="0"/>
+              <a:t>param</a:t>
+            </a:r>
+            <a:r>
+              <a:rPr lang="en-US" dirty="0" smtClean="0"/>
+              <a:t>, though still not implemented</a:t>
+            </a:r>
+          </a:p>
+        </p:txBody>
+      </p:sp>
+    </p:spTree>
+    <p:extLst>
+      <p:ext uri="{BB962C8B-B14F-4D97-AF65-F5344CB8AC3E}">
+        <p14:creationId xmlns:p14="http://schemas.microsoft.com/office/powerpoint/2010/main" val="738376019"/>
+      </p:ext>
+    </p:extLst>
+  </p:cSld>
+  <p:clrMapOvr>
+    <a:masterClrMapping/>
+  </p:clrMapOvr>
+</p:sld>
+</file>
+
+<file path=ppt/slides/slide16.xml><?xml version="1.0" encoding="utf-8"?>
+<p:sld xmlns:a="http://schemas.openxmlformats.org/drawingml/2006/main" xmlns:r="http://schemas.openxmlformats.org/officeDocument/2006/relationships" xmlns:p="http://schemas.openxmlformats.org/presentationml/2006/main">
+  <p:cSld>
+    <p:spTree>
+      <p:nvGrpSpPr>
+        <p:cNvPr id="1" name=""/>
+        <p:cNvGrpSpPr/>
+        <p:nvPr/>
+      </p:nvGrpSpPr>
+      <p:grpSpPr>
+        <a:xfrm>
+          <a:off x="0" y="0"/>
+          <a:ext cx="0" cy="0"/>
+          <a:chOff x="0" y="0"/>
+          <a:chExt cx="0" cy="0"/>
+        </a:xfrm>
+      </p:grpSpPr>
+      <p:sp>
+        <p:nvSpPr>
+          <p:cNvPr id="2" name="Title 1"/>
+          <p:cNvSpPr>
+            <a:spLocks noGrp="1"/>
+          </p:cNvSpPr>
+          <p:nvPr>
+            <p:ph type="title"/>
+          </p:nvPr>
+        </p:nvSpPr>
+        <p:spPr/>
+        <p:txBody>
+          <a:bodyPr/>
+          <a:lstStyle/>
+          <a:p>
+            <a:r>
+              <a:rPr lang="en-US" dirty="0" smtClean="0"/>
+              <a:t>Version Tolerance Rules</a:t>
+            </a:r>
+            <a:endParaRPr lang="en-US" dirty="0"/>
+          </a:p>
+        </p:txBody>
+      </p:sp>
+      <p:sp>
+        <p:nvSpPr>
+          <p:cNvPr id="3" name="Content Placeholder 2"/>
+          <p:cNvSpPr>
+            <a:spLocks noGrp="1"/>
+          </p:cNvSpPr>
+          <p:nvPr>
+            <p:ph idx="1"/>
+          </p:nvPr>
+        </p:nvSpPr>
+        <p:spPr/>
+        <p:txBody>
+          <a:bodyPr/>
+          <a:lstStyle/>
+          <a:p>
+            <a:r>
+              <a:rPr lang="en-US" dirty="0"/>
+              <a:t>Never remove a serialized field.</a:t>
+            </a:r>
+          </a:p>
+          <a:p>
+            <a:r>
+              <a:rPr lang="en-US" dirty="0"/>
+              <a:t>Never apply the </a:t>
+            </a:r>
+            <a:r>
+              <a:rPr lang="en-US" dirty="0" err="1"/>
+              <a:t>NonSerializedAttribute</a:t>
+            </a:r>
+            <a:r>
+              <a:rPr lang="en-US" dirty="0"/>
+              <a:t> attribute to a field if the attribute was not applied to the field in the previous version.</a:t>
+            </a:r>
+          </a:p>
+          <a:p>
+            <a:r>
+              <a:rPr lang="en-US" dirty="0"/>
+              <a:t>Never change the name or the type of a serialized field.</a:t>
+            </a:r>
+          </a:p>
+          <a:p>
+            <a:r>
+              <a:rPr lang="en-US" dirty="0"/>
+              <a:t>When adding a new serialized field, apply the </a:t>
+            </a:r>
+            <a:r>
+              <a:rPr lang="en-US" dirty="0" err="1"/>
+              <a:t>OptionalFieldAttribute</a:t>
+            </a:r>
+            <a:r>
+              <a:rPr lang="en-US" dirty="0"/>
+              <a:t> attribute</a:t>
+            </a:r>
+            <a:r>
+              <a:rPr lang="en-US" dirty="0" smtClean="0"/>
+              <a:t>.</a:t>
+            </a:r>
+            <a:endParaRPr lang="en-US" dirty="0"/>
+          </a:p>
+        </p:txBody>
+      </p:sp>
+    </p:spTree>
+    <p:extLst>
+      <p:ext uri="{BB962C8B-B14F-4D97-AF65-F5344CB8AC3E}">
+        <p14:creationId xmlns:p14="http://schemas.microsoft.com/office/powerpoint/2010/main" val="856347723"/>
+      </p:ext>
+    </p:extLst>
+  </p:cSld>
+  <p:clrMapOvr>
+    <a:masterClrMapping/>
+  </p:clrMapOvr>
+</p:sld>
+</file>
+
+<file path=ppt/slides/slide17.xml><?xml version="1.0" encoding="utf-8"?>
+<p:sld xmlns:a="http://schemas.openxmlformats.org/drawingml/2006/main" xmlns:r="http://schemas.openxmlformats.org/officeDocument/2006/relationships" xmlns:p="http://schemas.openxmlformats.org/presentationml/2006/main">
+  <p:cSld>
+    <p:spTree>
+      <p:nvGrpSpPr>
+        <p:cNvPr id="1" name=""/>
+        <p:cNvGrpSpPr/>
+        <p:nvPr/>
+      </p:nvGrpSpPr>
+      <p:grpSpPr>
+        <a:xfrm>
+          <a:off x="0" y="0"/>
+          <a:ext cx="0" cy="0"/>
+          <a:chOff x="0" y="0"/>
+          <a:chExt cx="0" cy="0"/>
+        </a:xfrm>
+      </p:grpSpPr>
+      <p:sp>
+        <p:nvSpPr>
+          <p:cNvPr id="2" name="Title 1"/>
+          <p:cNvSpPr>
+            <a:spLocks noGrp="1"/>
+          </p:cNvSpPr>
+          <p:nvPr>
+            <p:ph type="title"/>
+          </p:nvPr>
+        </p:nvSpPr>
+        <p:spPr/>
+        <p:txBody>
+          <a:bodyPr/>
+          <a:lstStyle/>
+          <a:p>
+            <a:r>
+              <a:rPr lang="en-US" dirty="0" smtClean="0"/>
+              <a:t>Version Tolerance Rules</a:t>
+            </a:r>
+            <a:endParaRPr lang="en-US" dirty="0"/>
+          </a:p>
+        </p:txBody>
+      </p:sp>
+      <p:sp>
+        <p:nvSpPr>
+          <p:cNvPr id="3" name="Content Placeholder 2"/>
+          <p:cNvSpPr>
+            <a:spLocks noGrp="1"/>
+          </p:cNvSpPr>
+          <p:nvPr>
+            <p:ph idx="1"/>
+          </p:nvPr>
+        </p:nvSpPr>
+        <p:spPr/>
+        <p:txBody>
+          <a:bodyPr/>
+          <a:lstStyle/>
+          <a:p>
+            <a:r>
+              <a:rPr lang="en-US" dirty="0"/>
+              <a:t>When removing a </a:t>
+            </a:r>
+            <a:r>
+              <a:rPr lang="en-US" dirty="0" err="1"/>
+              <a:t>NonSerializedAttribute</a:t>
+            </a:r>
+            <a:r>
+              <a:rPr lang="en-US" dirty="0"/>
+              <a:t> attribute from a field (that was not </a:t>
+            </a:r>
+            <a:r>
+              <a:rPr lang="en-US" dirty="0" err="1"/>
+              <a:t>serializable</a:t>
+            </a:r>
+            <a:r>
+              <a:rPr lang="en-US" dirty="0"/>
+              <a:t> in a previous version), apply the </a:t>
+            </a:r>
+            <a:r>
+              <a:rPr lang="en-US" dirty="0" err="1"/>
+              <a:t>OptionalFieldAttribute</a:t>
+            </a:r>
+            <a:r>
+              <a:rPr lang="en-US" dirty="0"/>
+              <a:t> attribute.</a:t>
+            </a:r>
+          </a:p>
+          <a:p>
+            <a:r>
+              <a:rPr lang="en-US" dirty="0"/>
+              <a:t>For all optional fields, set meaningful defaults using the serialization callbacks unless 0 or </a:t>
+            </a:r>
+            <a:r>
+              <a:rPr lang="en-US" dirty="0" err="1"/>
+              <a:t>nullas</a:t>
+            </a:r>
+            <a:r>
+              <a:rPr lang="en-US" dirty="0"/>
+              <a:t> defaults are acceptable.</a:t>
+            </a:r>
+          </a:p>
+          <a:p>
+            <a:endParaRPr lang="en-US" dirty="0"/>
+          </a:p>
+        </p:txBody>
+      </p:sp>
+    </p:spTree>
+    <p:extLst>
+      <p:ext uri="{BB962C8B-B14F-4D97-AF65-F5344CB8AC3E}">
+        <p14:creationId xmlns:p14="http://schemas.microsoft.com/office/powerpoint/2010/main" val="3267720918"/>
+      </p:ext>
+    </p:extLst>
+  </p:cSld>
+  <p:clrMapOvr>
+    <a:masterClrMapping/>
+  </p:clrMapOvr>
+</p:sld>
+</file>
+
+<file path=ppt/slides/slide18.xml><?xml version="1.0" encoding="utf-8"?>
+<p:sld xmlns:a="http://schemas.openxmlformats.org/drawingml/2006/main" xmlns:r="http://schemas.openxmlformats.org/officeDocument/2006/relationships" xmlns:p="http://schemas.openxmlformats.org/presentationml/2006/main">
+  <p:cSld>
+    <p:spTree>
+      <p:nvGrpSpPr>
+        <p:cNvPr id="1" name=""/>
+        <p:cNvGrpSpPr/>
+        <p:nvPr/>
+      </p:nvGrpSpPr>
+      <p:grpSpPr>
+        <a:xfrm>
+          <a:off x="0" y="0"/>
+          <a:ext cx="0" cy="0"/>
+          <a:chOff x="0" y="0"/>
+          <a:chExt cx="0" cy="0"/>
+        </a:xfrm>
+      </p:grpSpPr>
+      <p:sp>
+        <p:nvSpPr>
+          <p:cNvPr id="2" name="Title 1"/>
+          <p:cNvSpPr>
+            <a:spLocks noGrp="1"/>
+          </p:cNvSpPr>
+          <p:nvPr>
+            <p:ph type="title"/>
+          </p:nvPr>
+        </p:nvSpPr>
+        <p:spPr/>
+        <p:txBody>
+          <a:bodyPr/>
+          <a:lstStyle/>
+          <a:p>
+            <a:r>
+              <a:rPr lang="en-US" dirty="0" smtClean="0"/>
+              <a:t>Versioning</a:t>
+            </a:r>
+            <a:endParaRPr lang="en-US" dirty="0"/>
+          </a:p>
+        </p:txBody>
+      </p:sp>
+      <p:sp>
+        <p:nvSpPr>
+          <p:cNvPr id="3" name="Content Placeholder 2"/>
+          <p:cNvSpPr>
+            <a:spLocks noGrp="1"/>
+          </p:cNvSpPr>
+          <p:nvPr>
+            <p:ph idx="1"/>
+          </p:nvPr>
+        </p:nvSpPr>
+        <p:spPr/>
+        <p:txBody>
+          <a:bodyPr/>
+          <a:lstStyle/>
+          <a:p>
+            <a:r>
+              <a:rPr lang="en-US" dirty="0"/>
+              <a:t>Other changes </a:t>
+            </a:r>
+            <a:r>
+              <a:rPr lang="en-US" dirty="0" smtClean="0"/>
+              <a:t>and other serializers require </a:t>
+            </a:r>
+            <a:r>
+              <a:rPr lang="en-US" dirty="0"/>
+              <a:t>custom serialization</a:t>
+            </a:r>
+          </a:p>
+          <a:p>
+            <a:pPr lvl="1"/>
+            <a:r>
+              <a:rPr lang="en-US" dirty="0"/>
+              <a:t>Member data type changes</a:t>
+            </a:r>
+          </a:p>
+          <a:p>
+            <a:pPr lvl="1"/>
+            <a:r>
+              <a:rPr lang="en-US" dirty="0"/>
+              <a:t>Semantic changes</a:t>
+            </a:r>
+            <a:endParaRPr lang="en-US" dirty="0"/>
+          </a:p>
+        </p:txBody>
+      </p:sp>
+    </p:spTree>
+    <p:extLst>
+      <p:ext uri="{BB962C8B-B14F-4D97-AF65-F5344CB8AC3E}">
+        <p14:creationId xmlns:p14="http://schemas.microsoft.com/office/powerpoint/2010/main" val="1700630518"/>
       </p:ext>
     </p:extLst>
   </p:cSld>

</xml_diff>

<commit_message>
Added unit testing info
</commit_message>
<xml_diff>
--- a/.NET Serialization.pptx
+++ b/.NET Serialization.pptx
@@ -23,6 +23,8 @@
     <p:sldId id="285" r:id="rId17"/>
     <p:sldId id="286" r:id="rId18"/>
     <p:sldId id="287" r:id="rId19"/>
+    <p:sldId id="288" r:id="rId20"/>
+    <p:sldId id="289" r:id="rId21"/>
   </p:sldIdLst>
   <p:sldSz cx="9144000" cy="6858000" type="screen4x3"/>
   <p:notesSz cx="6858000" cy="9144000"/>
@@ -26629,6 +26631,123 @@
 </p:sld>
 </file>
 
+<file path=ppt/slides/slide19.xml><?xml version="1.0" encoding="utf-8"?>
+<p:sld xmlns:a="http://schemas.openxmlformats.org/drawingml/2006/main" xmlns:r="http://schemas.openxmlformats.org/officeDocument/2006/relationships" xmlns:p="http://schemas.openxmlformats.org/presentationml/2006/main">
+  <p:cSld>
+    <p:spTree>
+      <p:nvGrpSpPr>
+        <p:cNvPr id="1" name=""/>
+        <p:cNvGrpSpPr/>
+        <p:nvPr/>
+      </p:nvGrpSpPr>
+      <p:grpSpPr>
+        <a:xfrm>
+          <a:off x="0" y="0"/>
+          <a:ext cx="0" cy="0"/>
+          <a:chOff x="0" y="0"/>
+          <a:chExt cx="0" cy="0"/>
+        </a:xfrm>
+      </p:grpSpPr>
+      <p:sp>
+        <p:nvSpPr>
+          <p:cNvPr id="2" name="Title 1"/>
+          <p:cNvSpPr>
+            <a:spLocks noGrp="1"/>
+          </p:cNvSpPr>
+          <p:nvPr>
+            <p:ph type="title"/>
+          </p:nvPr>
+        </p:nvSpPr>
+        <p:spPr/>
+        <p:txBody>
+          <a:bodyPr/>
+          <a:lstStyle/>
+          <a:p>
+            <a:r>
+              <a:rPr lang="en-US" dirty="0" smtClean="0"/>
+              <a:t>Unit Testing</a:t>
+            </a:r>
+            <a:endParaRPr lang="en-US" dirty="0"/>
+          </a:p>
+        </p:txBody>
+      </p:sp>
+      <p:sp>
+        <p:nvSpPr>
+          <p:cNvPr id="3" name="Content Placeholder 2"/>
+          <p:cNvSpPr>
+            <a:spLocks noGrp="1"/>
+          </p:cNvSpPr>
+          <p:nvPr>
+            <p:ph idx="1"/>
+          </p:nvPr>
+        </p:nvSpPr>
+        <p:spPr/>
+        <p:txBody>
+          <a:bodyPr/>
+          <a:lstStyle/>
+          <a:p>
+            <a:r>
+              <a:rPr lang="en-US" dirty="0" smtClean="0"/>
+              <a:t>Now that you have all this code…</a:t>
+            </a:r>
+          </a:p>
+          <a:p>
+            <a:pPr lvl="1"/>
+            <a:r>
+              <a:rPr lang="en-US" dirty="0" smtClean="0"/>
+              <a:t>Make sure various data types serialize/</a:t>
+            </a:r>
+            <a:r>
+              <a:rPr lang="en-US" dirty="0" err="1" smtClean="0"/>
+              <a:t>deserialize</a:t>
+            </a:r>
+            <a:endParaRPr lang="en-US" dirty="0" smtClean="0"/>
+          </a:p>
+          <a:p>
+            <a:pPr lvl="1"/>
+            <a:r>
+              <a:rPr lang="en-US" dirty="0" smtClean="0"/>
+              <a:t>Custom serialization </a:t>
+            </a:r>
+            <a:r>
+              <a:rPr lang="en-US" b="1" u="sng" dirty="0" smtClean="0"/>
+              <a:t>needs</a:t>
+            </a:r>
+            <a:r>
+              <a:rPr lang="en-US" dirty="0" smtClean="0"/>
+              <a:t> testing!</a:t>
+            </a:r>
+          </a:p>
+          <a:p>
+            <a:pPr lvl="2"/>
+            <a:r>
+              <a:rPr lang="en-US" dirty="0" smtClean="0"/>
+              <a:t>Easy to mess up</a:t>
+            </a:r>
+          </a:p>
+          <a:p>
+            <a:pPr lvl="2"/>
+            <a:r>
+              <a:rPr lang="en-US" dirty="0" smtClean="0"/>
+              <a:t>Easy to break</a:t>
+            </a:r>
+            <a:endParaRPr lang="en-US" dirty="0"/>
+          </a:p>
+        </p:txBody>
+      </p:sp>
+    </p:spTree>
+    <p:extLst>
+      <p:ext uri="{BB962C8B-B14F-4D97-AF65-F5344CB8AC3E}">
+        <p14:creationId xmlns:p14="http://schemas.microsoft.com/office/powerpoint/2010/main" val="2292945018"/>
+      </p:ext>
+    </p:extLst>
+  </p:cSld>
+  <p:clrMapOvr>
+    <a:masterClrMapping/>
+  </p:clrMapOvr>
+</p:sld>
+</file>
+
 <file path=ppt/slides/slide2.xml><?xml version="1.0" encoding="utf-8"?>
 <p:sld xmlns:a="http://schemas.openxmlformats.org/drawingml/2006/main" xmlns:r="http://schemas.openxmlformats.org/officeDocument/2006/relationships" xmlns:p="http://schemas.openxmlformats.org/presentationml/2006/main">
   <p:cSld>
@@ -26740,6 +26859,166 @@
     <p:extLst>
       <p:ext uri="{BB962C8B-B14F-4D97-AF65-F5344CB8AC3E}">
         <p14:creationId xmlns:p14="http://schemas.microsoft.com/office/powerpoint/2010/main" val="4045814141"/>
+      </p:ext>
+    </p:extLst>
+  </p:cSld>
+  <p:clrMapOvr>
+    <a:masterClrMapping/>
+  </p:clrMapOvr>
+</p:sld>
+</file>
+
+<file path=ppt/slides/slide20.xml><?xml version="1.0" encoding="utf-8"?>
+<p:sld xmlns:a="http://schemas.openxmlformats.org/drawingml/2006/main" xmlns:r="http://schemas.openxmlformats.org/officeDocument/2006/relationships" xmlns:p="http://schemas.openxmlformats.org/presentationml/2006/main">
+  <p:cSld>
+    <p:spTree>
+      <p:nvGrpSpPr>
+        <p:cNvPr id="1" name=""/>
+        <p:cNvGrpSpPr/>
+        <p:nvPr/>
+      </p:nvGrpSpPr>
+      <p:grpSpPr>
+        <a:xfrm>
+          <a:off x="0" y="0"/>
+          <a:ext cx="0" cy="0"/>
+          <a:chOff x="0" y="0"/>
+          <a:chExt cx="0" cy="0"/>
+        </a:xfrm>
+      </p:grpSpPr>
+      <p:sp>
+        <p:nvSpPr>
+          <p:cNvPr id="2" name="Title 1"/>
+          <p:cNvSpPr>
+            <a:spLocks noGrp="1"/>
+          </p:cNvSpPr>
+          <p:nvPr>
+            <p:ph type="title"/>
+          </p:nvPr>
+        </p:nvSpPr>
+        <p:spPr/>
+        <p:txBody>
+          <a:bodyPr/>
+          <a:lstStyle/>
+          <a:p>
+            <a:r>
+              <a:rPr lang="en-US" dirty="0" smtClean="0"/>
+              <a:t>Questions</a:t>
+            </a:r>
+            <a:endParaRPr lang="en-US" dirty="0"/>
+          </a:p>
+        </p:txBody>
+      </p:sp>
+      <p:pic>
+        <p:nvPicPr>
+          <p:cNvPr id="6" name="Content Placeholder 5"/>
+          <p:cNvPicPr>
+            <a:picLocks noGrp="1" noChangeAspect="1"/>
+          </p:cNvPicPr>
+          <p:nvPr>
+            <p:ph idx="1"/>
+          </p:nvPr>
+        </p:nvPicPr>
+        <p:blipFill>
+          <a:blip r:embed="rId2">
+            <a:extLst>
+              <a:ext uri="{28A0092B-C50C-407E-A947-70E740481C1C}">
+                <a14:useLocalDpi xmlns:a14="http://schemas.microsoft.com/office/drawing/2010/main" val="0"/>
+              </a:ext>
+            </a:extLst>
+          </a:blip>
+          <a:stretch>
+            <a:fillRect/>
+          </a:stretch>
+        </p:blipFill>
+        <p:spPr>
+          <a:xfrm>
+            <a:off x="1445419" y="1432733"/>
+            <a:ext cx="6253162" cy="4439429"/>
+          </a:xfrm>
+          <a:ln>
+            <a:solidFill>
+              <a:schemeClr val="accent6">
+                <a:lumMod val="50000"/>
+              </a:schemeClr>
+            </a:solidFill>
+          </a:ln>
+          <a:effectLst>
+            <a:outerShdw blurRad="76200" dir="13500000" sy="23000" kx="1200000" algn="br" rotWithShape="0">
+              <a:prstClr val="black">
+                <a:alpha val="20000"/>
+              </a:prstClr>
+            </a:outerShdw>
+          </a:effectLst>
+        </p:spPr>
+      </p:pic>
+      <p:sp>
+        <p:nvSpPr>
+          <p:cNvPr id="4" name="TextBox 3"/>
+          <p:cNvSpPr txBox="1"/>
+          <p:nvPr/>
+        </p:nvSpPr>
+        <p:spPr>
+          <a:xfrm>
+            <a:off x="457200" y="6316662"/>
+            <a:ext cx="1303562" cy="369332"/>
+          </a:xfrm>
+          <a:prstGeom prst="rect">
+            <a:avLst/>
+          </a:prstGeom>
+          <a:noFill/>
+        </p:spPr>
+        <p:txBody>
+          <a:bodyPr wrap="none" rtlCol="0">
+            <a:spAutoFit/>
+          </a:bodyPr>
+          <a:lstStyle/>
+          <a:p>
+            <a:r>
+              <a:rPr lang="en-US" dirty="0" smtClean="0"/>
+              <a:t>@</a:t>
+            </a:r>
+            <a:r>
+              <a:rPr lang="en-US" dirty="0" err="1" smtClean="0"/>
+              <a:t>gregsohl</a:t>
+            </a:r>
+            <a:endParaRPr lang="en-US" dirty="0"/>
+          </a:p>
+        </p:txBody>
+      </p:sp>
+      <p:sp>
+        <p:nvSpPr>
+          <p:cNvPr id="5" name="TextBox 4"/>
+          <p:cNvSpPr txBox="1"/>
+          <p:nvPr/>
+        </p:nvSpPr>
+        <p:spPr>
+          <a:xfrm>
+            <a:off x="6219458" y="6316662"/>
+            <a:ext cx="2467342" cy="369332"/>
+          </a:xfrm>
+          <a:prstGeom prst="rect">
+            <a:avLst/>
+          </a:prstGeom>
+          <a:noFill/>
+        </p:spPr>
+        <p:txBody>
+          <a:bodyPr wrap="none" rtlCol="0">
+            <a:spAutoFit/>
+          </a:bodyPr>
+          <a:lstStyle/>
+          <a:p>
+            <a:r>
+              <a:rPr lang="en-US" dirty="0" smtClean="0"/>
+              <a:t>http://cwi-websoft.com</a:t>
+            </a:r>
+            <a:endParaRPr lang="en-US" dirty="0"/>
+          </a:p>
+        </p:txBody>
+      </p:sp>
+    </p:spTree>
+    <p:extLst>
+      <p:ext uri="{BB962C8B-B14F-4D97-AF65-F5344CB8AC3E}">
+        <p14:creationId xmlns:p14="http://schemas.microsoft.com/office/powerpoint/2010/main" val="3813849826"/>
       </p:ext>
     </p:extLst>
   </p:cSld>

</xml_diff>